<commit_message>
PPT final análisis predictivo
</commit_message>
<xml_diff>
--- a/Final APRED.pptx
+++ b/Final APRED.pptx
@@ -275,7 +275,7 @@
   </p:defaultTextStyle>
   <p:extLst>
     <p:ext uri="GoogleSlidesCustomDataVersion2">
-      <go:slidesCustomData xmlns:go="http://customooxmlschemas.google.com/" r:id="rId34" roundtripDataSignature="AMtx7mhxHm4+nb5nK2er1PJnj9V0+WjzTA=="/>
+      <go:slidesCustomData xmlns:go="http://customooxmlschemas.google.com/" r:id="rId34" roundtripDataSignature="AMtx7mjvkweVqzH6PsPn2+hGwVOsqB0a2g=="/>
     </p:ext>
   </p:extLst>
 </p:presentation>
@@ -3184,7 +3184,7 @@
   <p:cSld>
     <p:spTree>
       <p:nvGrpSpPr>
-        <p:cNvPr id="301" name="Shape 301"/>
+        <p:cNvPr id="300" name="Shape 300"/>
         <p:cNvGrpSpPr/>
         <p:nvPr/>
       </p:nvGrpSpPr>
@@ -3198,7 +3198,7 @@
       </p:grpSpPr>
       <p:sp>
         <p:nvSpPr>
-          <p:cNvPr id="302" name="Google Shape;302;p24:notes"/>
+          <p:cNvPr id="301" name="Google Shape;301;p24:notes"/>
           <p:cNvSpPr/>
           <p:nvPr>
             <p:ph idx="2" type="sldImg"/>
@@ -3243,7 +3243,7 @@
       </p:sp>
       <p:sp>
         <p:nvSpPr>
-          <p:cNvPr id="303" name="Google Shape;303;p24:notes"/>
+          <p:cNvPr id="302" name="Google Shape;302;p24:notes"/>
           <p:cNvSpPr txBox="1"/>
           <p:nvPr>
             <p:ph idx="1" type="body"/>
@@ -3290,7 +3290,7 @@
       </p:sp>
       <p:sp>
         <p:nvSpPr>
-          <p:cNvPr id="304" name="Google Shape;304;p24:notes"/>
+          <p:cNvPr id="303" name="Google Shape;303;p24:notes"/>
           <p:cNvSpPr txBox="1"/>
           <p:nvPr>
             <p:ph idx="12" type="sldNum"/>
@@ -3353,7 +3353,7 @@
   <p:cSld>
     <p:spTree>
       <p:nvGrpSpPr>
-        <p:cNvPr id="318" name="Shape 318"/>
+        <p:cNvPr id="316" name="Shape 316"/>
         <p:cNvGrpSpPr/>
         <p:nvPr/>
       </p:nvGrpSpPr>
@@ -3367,7 +3367,7 @@
       </p:grpSpPr>
       <p:sp>
         <p:nvSpPr>
-          <p:cNvPr id="319" name="Google Shape;319;p25:notes"/>
+          <p:cNvPr id="317" name="Google Shape;317;p25:notes"/>
           <p:cNvSpPr/>
           <p:nvPr>
             <p:ph idx="2" type="sldImg"/>
@@ -3412,7 +3412,7 @@
       </p:sp>
       <p:sp>
         <p:nvSpPr>
-          <p:cNvPr id="320" name="Google Shape;320;p25:notes"/>
+          <p:cNvPr id="318" name="Google Shape;318;p25:notes"/>
           <p:cNvSpPr txBox="1"/>
           <p:nvPr>
             <p:ph idx="1" type="body"/>
@@ -3487,7 +3487,7 @@
       </p:sp>
       <p:sp>
         <p:nvSpPr>
-          <p:cNvPr id="321" name="Google Shape;321;p25:notes"/>
+          <p:cNvPr id="319" name="Google Shape;319;p25:notes"/>
           <p:cNvSpPr txBox="1"/>
           <p:nvPr>
             <p:ph idx="12" type="sldNum"/>
@@ -3719,7 +3719,7 @@
   <p:cSld>
     <p:spTree>
       <p:nvGrpSpPr>
-        <p:cNvPr id="336" name="Shape 336"/>
+        <p:cNvPr id="334" name="Shape 334"/>
         <p:cNvGrpSpPr/>
         <p:nvPr/>
       </p:nvGrpSpPr>
@@ -3733,7 +3733,7 @@
       </p:grpSpPr>
       <p:sp>
         <p:nvSpPr>
-          <p:cNvPr id="337" name="Google Shape;337;p26:notes"/>
+          <p:cNvPr id="335" name="Google Shape;335;p26:notes"/>
           <p:cNvSpPr/>
           <p:nvPr>
             <p:ph idx="2" type="sldImg"/>
@@ -3778,7 +3778,7 @@
       </p:sp>
       <p:sp>
         <p:nvSpPr>
-          <p:cNvPr id="338" name="Google Shape;338;p26:notes"/>
+          <p:cNvPr id="336" name="Google Shape;336;p26:notes"/>
           <p:cNvSpPr txBox="1"/>
           <p:nvPr>
             <p:ph idx="1" type="body"/>
@@ -3825,7 +3825,7 @@
       </p:sp>
       <p:sp>
         <p:nvSpPr>
-          <p:cNvPr id="339" name="Google Shape;339;p26:notes"/>
+          <p:cNvPr id="337" name="Google Shape;337;p26:notes"/>
           <p:cNvSpPr txBox="1"/>
           <p:nvPr>
             <p:ph idx="12" type="sldNum"/>
@@ -3888,7 +3888,7 @@
   <p:cSld>
     <p:spTree>
       <p:nvGrpSpPr>
-        <p:cNvPr id="355" name="Shape 355"/>
+        <p:cNvPr id="353" name="Shape 353"/>
         <p:cNvGrpSpPr/>
         <p:nvPr/>
       </p:nvGrpSpPr>
@@ -3902,7 +3902,7 @@
       </p:grpSpPr>
       <p:sp>
         <p:nvSpPr>
-          <p:cNvPr id="356" name="Google Shape;356;p27:notes"/>
+          <p:cNvPr id="354" name="Google Shape;354;p27:notes"/>
           <p:cNvSpPr/>
           <p:nvPr>
             <p:ph idx="2" type="sldImg"/>
@@ -3947,7 +3947,7 @@
       </p:sp>
       <p:sp>
         <p:nvSpPr>
-          <p:cNvPr id="357" name="Google Shape;357;p27:notes"/>
+          <p:cNvPr id="355" name="Google Shape;355;p27:notes"/>
           <p:cNvSpPr txBox="1"/>
           <p:nvPr>
             <p:ph idx="1" type="body"/>
@@ -3994,7 +3994,7 @@
       </p:sp>
       <p:sp>
         <p:nvSpPr>
-          <p:cNvPr id="358" name="Google Shape;358;p27:notes"/>
+          <p:cNvPr id="356" name="Google Shape;356;p27:notes"/>
           <p:cNvSpPr txBox="1"/>
           <p:nvPr>
             <p:ph idx="12" type="sldNum"/>
@@ -4057,7 +4057,7 @@
   <p:cSld>
     <p:spTree>
       <p:nvGrpSpPr>
-        <p:cNvPr id="367" name="Shape 367"/>
+        <p:cNvPr id="365" name="Shape 365"/>
         <p:cNvGrpSpPr/>
         <p:nvPr/>
       </p:nvGrpSpPr>
@@ -4071,7 +4071,7 @@
       </p:grpSpPr>
       <p:sp>
         <p:nvSpPr>
-          <p:cNvPr id="368" name="Google Shape;368;p28:notes"/>
+          <p:cNvPr id="366" name="Google Shape;366;p28:notes"/>
           <p:cNvSpPr/>
           <p:nvPr>
             <p:ph idx="2" type="sldImg"/>
@@ -4116,7 +4116,7 @@
       </p:sp>
       <p:sp>
         <p:nvSpPr>
-          <p:cNvPr id="369" name="Google Shape;369;p28:notes"/>
+          <p:cNvPr id="367" name="Google Shape;367;p28:notes"/>
           <p:cNvSpPr txBox="1"/>
           <p:nvPr>
             <p:ph idx="1" type="body"/>
@@ -4163,7 +4163,7 @@
       </p:sp>
       <p:sp>
         <p:nvSpPr>
-          <p:cNvPr id="370" name="Google Shape;370;p28:notes"/>
+          <p:cNvPr id="368" name="Google Shape;368;p28:notes"/>
           <p:cNvSpPr txBox="1"/>
           <p:nvPr>
             <p:ph idx="12" type="sldNum"/>
@@ -4226,7 +4226,7 @@
   <p:cSld>
     <p:spTree>
       <p:nvGrpSpPr>
-        <p:cNvPr id="378" name="Shape 378"/>
+        <p:cNvPr id="376" name="Shape 376"/>
         <p:cNvGrpSpPr/>
         <p:nvPr/>
       </p:nvGrpSpPr>
@@ -4240,7 +4240,7 @@
       </p:grpSpPr>
       <p:sp>
         <p:nvSpPr>
-          <p:cNvPr id="379" name="Google Shape;379;p29:notes"/>
+          <p:cNvPr id="377" name="Google Shape;377;p29:notes"/>
           <p:cNvSpPr/>
           <p:nvPr>
             <p:ph idx="2" type="sldImg"/>
@@ -4285,7 +4285,7 @@
       </p:sp>
       <p:sp>
         <p:nvSpPr>
-          <p:cNvPr id="380" name="Google Shape;380;p29:notes"/>
+          <p:cNvPr id="378" name="Google Shape;378;p29:notes"/>
           <p:cNvSpPr txBox="1"/>
           <p:nvPr>
             <p:ph idx="1" type="body"/>
@@ -4356,7 +4356,7 @@
       </p:sp>
       <p:sp>
         <p:nvSpPr>
-          <p:cNvPr id="381" name="Google Shape;381;p29:notes"/>
+          <p:cNvPr id="379" name="Google Shape;379;p29:notes"/>
           <p:cNvSpPr txBox="1"/>
           <p:nvPr>
             <p:ph idx="12" type="sldNum"/>
@@ -4419,7 +4419,7 @@
   <p:cSld>
     <p:spTree>
       <p:nvGrpSpPr>
-        <p:cNvPr id="390" name="Shape 390"/>
+        <p:cNvPr id="388" name="Shape 388"/>
         <p:cNvGrpSpPr/>
         <p:nvPr/>
       </p:nvGrpSpPr>
@@ -4433,7 +4433,7 @@
       </p:grpSpPr>
       <p:sp>
         <p:nvSpPr>
-          <p:cNvPr id="391" name="Google Shape;391;p30:notes"/>
+          <p:cNvPr id="389" name="Google Shape;389;p30:notes"/>
           <p:cNvSpPr txBox="1"/>
           <p:nvPr>
             <p:ph idx="1" type="body"/>
@@ -4480,7 +4480,7 @@
       </p:sp>
       <p:sp>
         <p:nvSpPr>
-          <p:cNvPr id="392" name="Google Shape;392;p30:notes"/>
+          <p:cNvPr id="390" name="Google Shape;390;p30:notes"/>
           <p:cNvSpPr/>
           <p:nvPr>
             <p:ph idx="2" type="sldImg"/>
@@ -17546,122 +17546,6 @@
           </a:p>
         </p:txBody>
       </p:sp>
-      <p:sp>
-        <p:nvSpPr>
-          <p:cNvPr id="300" name="Google Shape;300;p23"/>
-          <p:cNvSpPr txBox="1"/>
-          <p:nvPr/>
-        </p:nvSpPr>
-        <p:spPr>
-          <a:xfrm>
-            <a:off x="5980225" y="707300"/>
-            <a:ext cx="3000000" cy="1122900"/>
-          </a:xfrm>
-          <a:prstGeom prst="rect">
-            <a:avLst/>
-          </a:prstGeom>
-          <a:noFill/>
-          <a:ln>
-            <a:noFill/>
-          </a:ln>
-        </p:spPr>
-        <p:txBody>
-          <a:bodyPr anchorCtr="0" anchor="t" bIns="91425" lIns="91425" spcFirstLastPara="1" rIns="91425" wrap="square" tIns="91425">
-            <a:spAutoFit/>
-          </a:bodyPr>
-          <a:lstStyle/>
-          <a:p>
-            <a:pPr indent="0" lvl="0" marL="0" rtl="0" algn="l">
-              <a:lnSpc>
-                <a:spcPct val="115000"/>
-              </a:lnSpc>
-              <a:spcBef>
-                <a:spcPts val="1500"/>
-              </a:spcBef>
-              <a:spcAft>
-                <a:spcPts val="0"/>
-              </a:spcAft>
-              <a:buNone/>
-            </a:pPr>
-            <a:r>
-              <a:t/>
-            </a:r>
-            <a:endParaRPr sz="1050">
-              <a:solidFill>
-                <a:srgbClr val="188038"/>
-              </a:solidFill>
-              <a:highlight>
-                <a:srgbClr val="F7F7F8"/>
-              </a:highlight>
-              <a:latin typeface="Courier New"/>
-              <a:ea typeface="Courier New"/>
-              <a:cs typeface="Courier New"/>
-              <a:sym typeface="Courier New"/>
-            </a:endParaRPr>
-          </a:p>
-          <a:p>
-            <a:pPr indent="-304800" lvl="0" marL="457200" rtl="0" algn="l">
-              <a:lnSpc>
-                <a:spcPct val="115000"/>
-              </a:lnSpc>
-              <a:spcBef>
-                <a:spcPts val="1500"/>
-              </a:spcBef>
-              <a:spcAft>
-                <a:spcPts val="0"/>
-              </a:spcAft>
-              <a:buClr>
-                <a:srgbClr val="374151"/>
-              </a:buClr>
-              <a:buSzPts val="1200"/>
-              <a:buFont typeface="Roboto"/>
-              <a:buChar char="●"/>
-            </a:pPr>
-            <a:r>
-              <a:rPr lang="en-US" sz="1200">
-                <a:solidFill>
-                  <a:srgbClr val="374151"/>
-                </a:solidFill>
-                <a:highlight>
-                  <a:srgbClr val="F7F7F8"/>
-                </a:highlight>
-                <a:latin typeface="Roboto"/>
-                <a:ea typeface="Roboto"/>
-                <a:cs typeface="Roboto"/>
-                <a:sym typeface="Roboto"/>
-              </a:rPr>
-              <a:t>LGBMClassifier: </a:t>
-            </a:r>
-            <a:r>
-              <a:rPr lang="en-US" sz="1050">
-                <a:solidFill>
-                  <a:srgbClr val="188038"/>
-                </a:solidFill>
-                <a:highlight>
-                  <a:srgbClr val="F7F7F8"/>
-                </a:highlight>
-                <a:latin typeface="Courier New"/>
-                <a:ea typeface="Courier New"/>
-                <a:cs typeface="Courier New"/>
-                <a:sym typeface="Courier New"/>
-              </a:rPr>
-              <a:t>{'num_leaves': 60, 'n_estimators': 100, 'learning_rate': 0.1}</a:t>
-            </a:r>
-            <a:endParaRPr sz="1050">
-              <a:solidFill>
-                <a:srgbClr val="188038"/>
-              </a:solidFill>
-              <a:highlight>
-                <a:srgbClr val="F7F7F8"/>
-              </a:highlight>
-              <a:latin typeface="Courier New"/>
-              <a:ea typeface="Courier New"/>
-              <a:cs typeface="Courier New"/>
-              <a:sym typeface="Courier New"/>
-            </a:endParaRPr>
-          </a:p>
-        </p:txBody>
-      </p:sp>
     </p:spTree>
   </p:cSld>
   <p:clrMapOvr>
@@ -17675,7 +17559,7 @@
   <p:cSld>
     <p:spTree>
       <p:nvGrpSpPr>
-        <p:cNvPr id="305" name="Shape 305"/>
+        <p:cNvPr id="304" name="Shape 304"/>
         <p:cNvGrpSpPr/>
         <p:nvPr/>
       </p:nvGrpSpPr>
@@ -17689,7 +17573,7 @@
       </p:grpSpPr>
       <p:sp>
         <p:nvSpPr>
-          <p:cNvPr id="306" name="Google Shape;306;p24"/>
+          <p:cNvPr id="305" name="Google Shape;305;p24"/>
           <p:cNvSpPr txBox="1"/>
           <p:nvPr>
             <p:ph idx="12" type="sldNum"/>
@@ -17741,7 +17625,7 @@
       </p:sp>
       <p:sp>
         <p:nvSpPr>
-          <p:cNvPr id="307" name="Google Shape;307;p24"/>
+          <p:cNvPr id="306" name="Google Shape;306;p24"/>
           <p:cNvSpPr txBox="1"/>
           <p:nvPr/>
         </p:nvSpPr>
@@ -17794,6 +17678,72 @@
               <a:t>XGB</a:t>
             </a:r>
             <a:endParaRPr b="1" i="0" sz="2700" u="none" cap="none" strike="noStrike">
+              <a:solidFill>
+                <a:srgbClr val="0D5486"/>
+              </a:solidFill>
+              <a:latin typeface="Arial"/>
+              <a:ea typeface="Arial"/>
+              <a:cs typeface="Arial"/>
+              <a:sym typeface="Arial"/>
+            </a:endParaRPr>
+          </a:p>
+        </p:txBody>
+      </p:sp>
+      <p:sp>
+        <p:nvSpPr>
+          <p:cNvPr id="307" name="Google Shape;307;p24"/>
+          <p:cNvSpPr txBox="1"/>
+          <p:nvPr/>
+        </p:nvSpPr>
+        <p:spPr>
+          <a:xfrm>
+            <a:off x="7822237" y="192699"/>
+            <a:ext cx="4924772" cy="400110"/>
+          </a:xfrm>
+          <a:prstGeom prst="rect">
+            <a:avLst/>
+          </a:prstGeom>
+          <a:noFill/>
+          <a:ln>
+            <a:noFill/>
+          </a:ln>
+        </p:spPr>
+        <p:txBody>
+          <a:bodyPr anchorCtr="0" anchor="t" bIns="45700" lIns="108000" spcFirstLastPara="1" rIns="108000" wrap="square" tIns="45700">
+            <a:spAutoFit/>
+          </a:bodyPr>
+          <a:lstStyle/>
+          <a:p>
+            <a:pPr indent="0" lvl="0" marL="0" marR="0" rtl="0" algn="l">
+              <a:lnSpc>
+                <a:spcPct val="100000"/>
+              </a:lnSpc>
+              <a:spcBef>
+                <a:spcPts val="0"/>
+              </a:spcBef>
+              <a:spcAft>
+                <a:spcPts val="0"/>
+              </a:spcAft>
+              <a:buClr>
+                <a:srgbClr val="000000"/>
+              </a:buClr>
+              <a:buSzPts val="2000"/>
+              <a:buFont typeface="Arial"/>
+              <a:buNone/>
+            </a:pPr>
+            <a:r>
+              <a:rPr b="1" i="0" lang="en-US" sz="2000" u="none" cap="none" strike="noStrike">
+                <a:solidFill>
+                  <a:srgbClr val="0D5486"/>
+                </a:solidFill>
+                <a:latin typeface="Arial"/>
+                <a:ea typeface="Arial"/>
+                <a:cs typeface="Arial"/>
+                <a:sym typeface="Arial"/>
+              </a:rPr>
+              <a:t>03. Comparación de Modelos</a:t>
+            </a:r>
+            <a:endParaRPr b="1" i="0" sz="2000" u="none" cap="none" strike="noStrike">
               <a:solidFill>
                 <a:srgbClr val="0D5486"/>
               </a:solidFill>
@@ -17813,8 +17763,8 @@
         </p:nvSpPr>
         <p:spPr>
           <a:xfrm>
-            <a:off x="7822237" y="192699"/>
-            <a:ext cx="4924772" cy="400110"/>
+            <a:off x="707656" y="1871309"/>
+            <a:ext cx="7592456" cy="400110"/>
           </a:xfrm>
           <a:prstGeom prst="rect">
             <a:avLst/>
@@ -17850,18 +17800,18 @@
             <a:r>
               <a:rPr b="1" i="0" lang="en-US" sz="2000" u="none" cap="none" strike="noStrike">
                 <a:solidFill>
-                  <a:srgbClr val="0D5486"/>
+                  <a:srgbClr val="757070"/>
                 </a:solidFill>
                 <a:latin typeface="Arial"/>
                 <a:ea typeface="Arial"/>
                 <a:cs typeface="Arial"/>
                 <a:sym typeface="Arial"/>
               </a:rPr>
-              <a:t>03. Comparación de Modelos</a:t>
+              <a:t>Randomized Search (100 iterations) con Cross Validation (5) </a:t>
             </a:r>
             <a:endParaRPr b="1" i="0" sz="2000" u="none" cap="none" strike="noStrike">
               <a:solidFill>
-                <a:srgbClr val="0D5486"/>
+                <a:srgbClr val="757070"/>
               </a:solidFill>
               <a:latin typeface="Arial"/>
               <a:ea typeface="Arial"/>
@@ -17879,8 +17829,8 @@
         </p:nvSpPr>
         <p:spPr>
           <a:xfrm>
-            <a:off x="707656" y="1871309"/>
-            <a:ext cx="7592456" cy="400110"/>
+            <a:off x="912374" y="2737620"/>
+            <a:ext cx="5069016" cy="2828082"/>
           </a:xfrm>
           <a:prstGeom prst="rect">
             <a:avLst/>
@@ -17891,43 +17841,523 @@
           </a:ln>
         </p:spPr>
         <p:txBody>
-          <a:bodyPr anchorCtr="0" anchor="t" bIns="45700" lIns="108000" spcFirstLastPara="1" rIns="108000" wrap="square" tIns="45700">
+          <a:bodyPr anchorCtr="0" anchor="t" bIns="45700" lIns="91425" spcFirstLastPara="1" rIns="91425" wrap="square" tIns="45700">
             <a:spAutoFit/>
           </a:bodyPr>
           <a:lstStyle/>
           <a:p>
             <a:pPr indent="0" lvl="0" marL="0" marR="0" rtl="0" algn="l">
               <a:lnSpc>
-                <a:spcPct val="100000"/>
-              </a:lnSpc>
-              <a:spcBef>
-                <a:spcPts val="0"/>
-              </a:spcBef>
-              <a:spcAft>
-                <a:spcPts val="0"/>
-              </a:spcAft>
-              <a:buClr>
-                <a:srgbClr val="000000"/>
-              </a:buClr>
-              <a:buSzPts val="2000"/>
+                <a:spcPct val="150000"/>
+              </a:lnSpc>
+              <a:spcBef>
+                <a:spcPts val="0"/>
+              </a:spcBef>
+              <a:spcAft>
+                <a:spcPts val="0"/>
+              </a:spcAft>
+              <a:buClr>
+                <a:srgbClr val="000000"/>
+              </a:buClr>
+              <a:buSzPts val="1200"/>
               <a:buFont typeface="Arial"/>
               <a:buNone/>
             </a:pPr>
             <a:r>
-              <a:rPr b="1" i="0" lang="en-US" sz="2000" u="none" cap="none" strike="noStrike">
-                <a:solidFill>
-                  <a:srgbClr val="757070"/>
+              <a:rPr b="0" i="0" lang="en-US" sz="1200" u="none" cap="none" strike="noStrike">
+                <a:solidFill>
+                  <a:srgbClr val="2F5496"/>
                 </a:solidFill>
                 <a:latin typeface="Arial"/>
                 <a:ea typeface="Arial"/>
                 <a:cs typeface="Arial"/>
                 <a:sym typeface="Arial"/>
               </a:rPr>
-              <a:t>Randomized Search (100 iterations) con Cross Validation (5) </a:t>
-            </a:r>
-            <a:endParaRPr b="1" i="0" sz="2000" u="none" cap="none" strike="noStrike">
+              <a:t>booster</a:t>
+            </a:r>
+            <a:r>
+              <a:rPr b="0" i="0" lang="en-US" sz="1200" u="none" cap="none" strike="noStrike">
+                <a:solidFill>
+                  <a:srgbClr val="000000"/>
+                </a:solidFill>
+                <a:latin typeface="Arial"/>
+                <a:ea typeface="Arial"/>
+                <a:cs typeface="Arial"/>
+                <a:sym typeface="Arial"/>
+              </a:rPr>
+              <a:t>: which booster to use.</a:t>
+            </a:r>
+            <a:endParaRPr b="0" i="0" sz="1400" u="none" cap="none" strike="noStrike">
               <a:solidFill>
-                <a:srgbClr val="757070"/>
+                <a:srgbClr val="000000"/>
+              </a:solidFill>
+              <a:latin typeface="Arial"/>
+              <a:ea typeface="Arial"/>
+              <a:cs typeface="Arial"/>
+              <a:sym typeface="Arial"/>
+            </a:endParaRPr>
+          </a:p>
+          <a:p>
+            <a:pPr indent="0" lvl="0" marL="0" marR="0" rtl="0" algn="l">
+              <a:lnSpc>
+                <a:spcPct val="150000"/>
+              </a:lnSpc>
+              <a:spcBef>
+                <a:spcPts val="0"/>
+              </a:spcBef>
+              <a:spcAft>
+                <a:spcPts val="0"/>
+              </a:spcAft>
+              <a:buClr>
+                <a:srgbClr val="000000"/>
+              </a:buClr>
+              <a:buSzPts val="1200"/>
+              <a:buFont typeface="Arial"/>
+              <a:buNone/>
+            </a:pPr>
+            <a:r>
+              <a:rPr b="0" i="0" lang="en-US" sz="1200" u="none" cap="none" strike="noStrike">
+                <a:solidFill>
+                  <a:srgbClr val="548135"/>
+                </a:solidFill>
+                <a:latin typeface="Arial"/>
+                <a:ea typeface="Arial"/>
+                <a:cs typeface="Arial"/>
+                <a:sym typeface="Arial"/>
+              </a:rPr>
+              <a:t>task</a:t>
+            </a:r>
+            <a:r>
+              <a:rPr b="0" i="0" lang="en-US" sz="1200" u="none" cap="none" strike="noStrike">
+                <a:solidFill>
+                  <a:srgbClr val="000000"/>
+                </a:solidFill>
+                <a:latin typeface="Arial"/>
+                <a:ea typeface="Arial"/>
+                <a:cs typeface="Arial"/>
+                <a:sym typeface="Arial"/>
+              </a:rPr>
+              <a:t>: (train – test)</a:t>
+            </a:r>
+            <a:endParaRPr b="0" i="0" sz="1400" u="none" cap="none" strike="noStrike">
+              <a:solidFill>
+                <a:srgbClr val="000000"/>
+              </a:solidFill>
+              <a:latin typeface="Arial"/>
+              <a:ea typeface="Arial"/>
+              <a:cs typeface="Arial"/>
+              <a:sym typeface="Arial"/>
+            </a:endParaRPr>
+          </a:p>
+          <a:p>
+            <a:pPr indent="0" lvl="0" marL="0" marR="0" rtl="0" algn="l">
+              <a:lnSpc>
+                <a:spcPct val="150000"/>
+              </a:lnSpc>
+              <a:spcBef>
+                <a:spcPts val="0"/>
+              </a:spcBef>
+              <a:spcAft>
+                <a:spcPts val="0"/>
+              </a:spcAft>
+              <a:buClr>
+                <a:srgbClr val="000000"/>
+              </a:buClr>
+              <a:buSzPts val="1200"/>
+              <a:buFont typeface="Arial"/>
+              <a:buNone/>
+            </a:pPr>
+            <a:r>
+              <a:rPr b="0" i="0" lang="en-US" sz="1200" u="none" cap="none" strike="noStrike">
+                <a:solidFill>
+                  <a:srgbClr val="548135"/>
+                </a:solidFill>
+                <a:latin typeface="Arial"/>
+                <a:ea typeface="Arial"/>
+                <a:cs typeface="Arial"/>
+                <a:sym typeface="Arial"/>
+              </a:rPr>
+              <a:t>max_depth</a:t>
+            </a:r>
+            <a:r>
+              <a:rPr b="0" i="0" lang="en-US" sz="1200" u="none" cap="none" strike="noStrike">
+                <a:solidFill>
+                  <a:srgbClr val="000000"/>
+                </a:solidFill>
+                <a:latin typeface="Arial"/>
+                <a:ea typeface="Arial"/>
+                <a:cs typeface="Arial"/>
+                <a:sym typeface="Arial"/>
+              </a:rPr>
+              <a:t>: limit the max depth for a tree.</a:t>
+            </a:r>
+            <a:endParaRPr b="0" i="0" sz="1400" u="none" cap="none" strike="noStrike">
+              <a:solidFill>
+                <a:srgbClr val="000000"/>
+              </a:solidFill>
+              <a:latin typeface="Arial"/>
+              <a:ea typeface="Arial"/>
+              <a:cs typeface="Arial"/>
+              <a:sym typeface="Arial"/>
+            </a:endParaRPr>
+          </a:p>
+          <a:p>
+            <a:pPr indent="0" lvl="0" marL="0" marR="0" rtl="0" algn="l">
+              <a:lnSpc>
+                <a:spcPct val="150000"/>
+              </a:lnSpc>
+              <a:spcBef>
+                <a:spcPts val="0"/>
+              </a:spcBef>
+              <a:spcAft>
+                <a:spcPts val="0"/>
+              </a:spcAft>
+              <a:buClr>
+                <a:srgbClr val="000000"/>
+              </a:buClr>
+              <a:buSzPts val="1200"/>
+              <a:buFont typeface="Arial"/>
+              <a:buNone/>
+            </a:pPr>
+            <a:r>
+              <a:rPr b="0" i="0" lang="en-US" sz="1200" u="none" cap="none" strike="noStrike">
+                <a:solidFill>
+                  <a:srgbClr val="548135"/>
+                </a:solidFill>
+                <a:latin typeface="Arial"/>
+                <a:ea typeface="Arial"/>
+                <a:cs typeface="Arial"/>
+                <a:sym typeface="Arial"/>
+              </a:rPr>
+              <a:t>min_child_weight: </a:t>
+            </a:r>
+            <a:r>
+              <a:rPr b="0" i="0" lang="en-US" sz="1200" u="none" cap="none" strike="noStrike">
+                <a:solidFill>
+                  <a:srgbClr val="000000"/>
+                </a:solidFill>
+                <a:latin typeface="Arial"/>
+                <a:ea typeface="Arial"/>
+                <a:cs typeface="Arial"/>
+                <a:sym typeface="Arial"/>
+              </a:rPr>
+              <a:t>minimum sum of instance weight needed in a child</a:t>
+            </a:r>
+            <a:endParaRPr b="0" i="0" sz="1400" u="none" cap="none" strike="noStrike">
+              <a:solidFill>
+                <a:srgbClr val="000000"/>
+              </a:solidFill>
+              <a:latin typeface="Arial"/>
+              <a:ea typeface="Arial"/>
+              <a:cs typeface="Arial"/>
+              <a:sym typeface="Arial"/>
+            </a:endParaRPr>
+          </a:p>
+          <a:p>
+            <a:pPr indent="0" lvl="0" marL="0" marR="0" rtl="0" algn="l">
+              <a:lnSpc>
+                <a:spcPct val="150000"/>
+              </a:lnSpc>
+              <a:spcBef>
+                <a:spcPts val="0"/>
+              </a:spcBef>
+              <a:spcAft>
+                <a:spcPts val="0"/>
+              </a:spcAft>
+              <a:buClr>
+                <a:srgbClr val="000000"/>
+              </a:buClr>
+              <a:buSzPts val="1200"/>
+              <a:buFont typeface="Arial"/>
+              <a:buNone/>
+            </a:pPr>
+            <a:r>
+              <a:rPr b="0" i="0" lang="en-US" sz="1200" u="none" cap="none" strike="noStrike">
+                <a:solidFill>
+                  <a:srgbClr val="548135"/>
+                </a:solidFill>
+                <a:latin typeface="Arial"/>
+                <a:ea typeface="Arial"/>
+                <a:cs typeface="Arial"/>
+                <a:sym typeface="Arial"/>
+              </a:rPr>
+              <a:t>max_bins</a:t>
+            </a:r>
+            <a:r>
+              <a:rPr b="0" i="0" lang="en-US" sz="1200" u="none" cap="none" strike="noStrike">
+                <a:solidFill>
+                  <a:srgbClr val="000000"/>
+                </a:solidFill>
+                <a:latin typeface="Arial"/>
+                <a:ea typeface="Arial"/>
+                <a:cs typeface="Arial"/>
+                <a:sym typeface="Arial"/>
+              </a:rPr>
+              <a:t>: max number of bins that feature values will be bucketed in</a:t>
+            </a:r>
+            <a:endParaRPr b="0" i="0" sz="1400" u="none" cap="none" strike="noStrike">
+              <a:solidFill>
+                <a:srgbClr val="000000"/>
+              </a:solidFill>
+              <a:latin typeface="Arial"/>
+              <a:ea typeface="Arial"/>
+              <a:cs typeface="Arial"/>
+              <a:sym typeface="Arial"/>
+            </a:endParaRPr>
+          </a:p>
+          <a:p>
+            <a:pPr indent="0" lvl="0" marL="0" marR="0" rtl="0" algn="l">
+              <a:lnSpc>
+                <a:spcPct val="150000"/>
+              </a:lnSpc>
+              <a:spcBef>
+                <a:spcPts val="0"/>
+              </a:spcBef>
+              <a:spcAft>
+                <a:spcPts val="0"/>
+              </a:spcAft>
+              <a:buClr>
+                <a:srgbClr val="000000"/>
+              </a:buClr>
+              <a:buSzPts val="1200"/>
+              <a:buFont typeface="Arial"/>
+              <a:buNone/>
+            </a:pPr>
+            <a:r>
+              <a:rPr b="0" i="0" lang="en-US" sz="1200" u="none" cap="none" strike="noStrike">
+                <a:solidFill>
+                  <a:srgbClr val="548135"/>
+                </a:solidFill>
+                <a:latin typeface="Arial"/>
+                <a:ea typeface="Arial"/>
+                <a:cs typeface="Arial"/>
+                <a:sym typeface="Arial"/>
+              </a:rPr>
+              <a:t>eval_metric</a:t>
+            </a:r>
+            <a:r>
+              <a:rPr b="0" i="0" lang="en-US" sz="1200" u="none" cap="none" strike="noStrike">
+                <a:solidFill>
+                  <a:srgbClr val="000000"/>
+                </a:solidFill>
+                <a:latin typeface="Arial"/>
+                <a:ea typeface="Arial"/>
+                <a:cs typeface="Arial"/>
+                <a:sym typeface="Arial"/>
+              </a:rPr>
+              <a:t>: evaluation metrics for validation data</a:t>
+            </a:r>
+            <a:endParaRPr b="0" i="0" sz="1400" u="none" cap="none" strike="noStrike">
+              <a:solidFill>
+                <a:srgbClr val="000000"/>
+              </a:solidFill>
+              <a:latin typeface="Arial"/>
+              <a:ea typeface="Arial"/>
+              <a:cs typeface="Arial"/>
+              <a:sym typeface="Arial"/>
+            </a:endParaRPr>
+          </a:p>
+          <a:p>
+            <a:pPr indent="0" lvl="0" marL="0" marR="0" rtl="0" algn="l">
+              <a:lnSpc>
+                <a:spcPct val="150000"/>
+              </a:lnSpc>
+              <a:spcBef>
+                <a:spcPts val="0"/>
+              </a:spcBef>
+              <a:spcAft>
+                <a:spcPts val="0"/>
+              </a:spcAft>
+              <a:buClr>
+                <a:srgbClr val="000000"/>
+              </a:buClr>
+              <a:buSzPts val="1200"/>
+              <a:buFont typeface="Arial"/>
+              <a:buNone/>
+            </a:pPr>
+            <a:r>
+              <a:rPr b="0" i="0" lang="en-US" sz="1200" u="none" cap="none" strike="noStrike">
+                <a:solidFill>
+                  <a:srgbClr val="548135"/>
+                </a:solidFill>
+                <a:latin typeface="Arial"/>
+                <a:ea typeface="Arial"/>
+                <a:cs typeface="Arial"/>
+                <a:sym typeface="Arial"/>
+              </a:rPr>
+              <a:t>sample_type: </a:t>
+            </a:r>
+            <a:r>
+              <a:rPr b="0" i="0" lang="en-US" sz="1200" u="none" cap="none" strike="noStrike">
+                <a:solidFill>
+                  <a:srgbClr val="000000"/>
+                </a:solidFill>
+                <a:latin typeface="Arial"/>
+                <a:ea typeface="Arial"/>
+                <a:cs typeface="Arial"/>
+                <a:sym typeface="Arial"/>
+              </a:rPr>
+              <a:t>type of sampling algorithm (uniform – weighted)</a:t>
+            </a:r>
+            <a:endParaRPr b="0" i="0" sz="1400" u="none" cap="none" strike="noStrike">
+              <a:solidFill>
+                <a:srgbClr val="000000"/>
+              </a:solidFill>
+              <a:latin typeface="Arial"/>
+              <a:ea typeface="Arial"/>
+              <a:cs typeface="Arial"/>
+              <a:sym typeface="Arial"/>
+            </a:endParaRPr>
+          </a:p>
+          <a:p>
+            <a:pPr indent="0" lvl="0" marL="0" marR="0" rtl="0" algn="l">
+              <a:lnSpc>
+                <a:spcPct val="150000"/>
+              </a:lnSpc>
+              <a:spcBef>
+                <a:spcPts val="0"/>
+              </a:spcBef>
+              <a:spcAft>
+                <a:spcPts val="0"/>
+              </a:spcAft>
+              <a:buClr>
+                <a:srgbClr val="000000"/>
+              </a:buClr>
+              <a:buSzPts val="1200"/>
+              <a:buFont typeface="Arial"/>
+              <a:buNone/>
+            </a:pPr>
+            <a:r>
+              <a:rPr b="0" i="0" lang="en-US" sz="1200" u="none" cap="none" strike="noStrike">
+                <a:solidFill>
+                  <a:srgbClr val="548135"/>
+                </a:solidFill>
+                <a:latin typeface="Arial"/>
+                <a:ea typeface="Arial"/>
+                <a:cs typeface="Arial"/>
+                <a:sym typeface="Arial"/>
+              </a:rPr>
+              <a:t>normalize_type</a:t>
+            </a:r>
+            <a:r>
+              <a:rPr b="0" i="0" lang="en-US" sz="1200" u="none" cap="none" strike="noStrike">
+                <a:solidFill>
+                  <a:srgbClr val="000000"/>
+                </a:solidFill>
+                <a:latin typeface="Arial"/>
+                <a:ea typeface="Arial"/>
+                <a:cs typeface="Arial"/>
+                <a:sym typeface="Arial"/>
+              </a:rPr>
+              <a:t>: type of normalization algorithm (based on learning rate)</a:t>
+            </a:r>
+            <a:endParaRPr b="0" i="0" sz="1400" u="none" cap="none" strike="noStrike">
+              <a:solidFill>
+                <a:srgbClr val="000000"/>
+              </a:solidFill>
+              <a:latin typeface="Arial"/>
+              <a:ea typeface="Arial"/>
+              <a:cs typeface="Arial"/>
+              <a:sym typeface="Arial"/>
+            </a:endParaRPr>
+          </a:p>
+          <a:p>
+            <a:pPr indent="0" lvl="0" marL="0" marR="0" rtl="0" algn="l">
+              <a:lnSpc>
+                <a:spcPct val="150000"/>
+              </a:lnSpc>
+              <a:spcBef>
+                <a:spcPts val="0"/>
+              </a:spcBef>
+              <a:spcAft>
+                <a:spcPts val="0"/>
+              </a:spcAft>
+              <a:buClr>
+                <a:srgbClr val="000000"/>
+              </a:buClr>
+              <a:buSzPts val="1200"/>
+              <a:buFont typeface="Arial"/>
+              <a:buNone/>
+            </a:pPr>
+            <a:r>
+              <a:rPr b="0" i="0" lang="en-US" sz="1200" u="none" cap="none" strike="noStrike">
+                <a:solidFill>
+                  <a:srgbClr val="548135"/>
+                </a:solidFill>
+                <a:latin typeface="Arial"/>
+                <a:ea typeface="Arial"/>
+                <a:cs typeface="Arial"/>
+                <a:sym typeface="Arial"/>
+              </a:rPr>
+              <a:t>reg_lambda</a:t>
+            </a:r>
+            <a:r>
+              <a:rPr b="0" i="0" lang="en-US" sz="1200" u="none" cap="none" strike="noStrike">
+                <a:solidFill>
+                  <a:srgbClr val="000000"/>
+                </a:solidFill>
+                <a:latin typeface="Arial"/>
+                <a:ea typeface="Arial"/>
+                <a:cs typeface="Arial"/>
+                <a:sym typeface="Arial"/>
+              </a:rPr>
+              <a:t>: L2 regularization</a:t>
+            </a:r>
+            <a:endParaRPr b="0" i="0" sz="1400" u="none" cap="none" strike="noStrike">
+              <a:solidFill>
+                <a:srgbClr val="000000"/>
+              </a:solidFill>
+              <a:latin typeface="Arial"/>
+              <a:ea typeface="Arial"/>
+              <a:cs typeface="Arial"/>
+              <a:sym typeface="Arial"/>
+            </a:endParaRPr>
+          </a:p>
+          <a:p>
+            <a:pPr indent="0" lvl="0" marL="0" marR="0" rtl="0" algn="l">
+              <a:lnSpc>
+                <a:spcPct val="150000"/>
+              </a:lnSpc>
+              <a:spcBef>
+                <a:spcPts val="0"/>
+              </a:spcBef>
+              <a:spcAft>
+                <a:spcPts val="0"/>
+              </a:spcAft>
+              <a:buClr>
+                <a:srgbClr val="000000"/>
+              </a:buClr>
+              <a:buSzPts val="1200"/>
+              <a:buFont typeface="Arial"/>
+              <a:buNone/>
+            </a:pPr>
+            <a:r>
+              <a:rPr b="0" i="0" lang="en-US" sz="1200" u="none" cap="none" strike="noStrike">
+                <a:solidFill>
+                  <a:srgbClr val="548135"/>
+                </a:solidFill>
+                <a:latin typeface="Arial"/>
+                <a:ea typeface="Arial"/>
+                <a:cs typeface="Arial"/>
+                <a:sym typeface="Arial"/>
+              </a:rPr>
+              <a:t>reg_alpha</a:t>
+            </a:r>
+            <a:r>
+              <a:rPr b="0" i="0" lang="en-US" sz="1200" u="none" cap="none" strike="noStrike">
+                <a:solidFill>
+                  <a:srgbClr val="000000"/>
+                </a:solidFill>
+                <a:latin typeface="Arial"/>
+                <a:ea typeface="Arial"/>
+                <a:cs typeface="Arial"/>
+                <a:sym typeface="Arial"/>
+              </a:rPr>
+              <a:t>: L1 regularization</a:t>
+            </a:r>
+            <a:endParaRPr b="0" i="0" sz="1400" u="none" cap="none" strike="noStrike">
+              <a:solidFill>
+                <a:srgbClr val="000000"/>
               </a:solidFill>
               <a:latin typeface="Arial"/>
               <a:ea typeface="Arial"/>
@@ -17940,540 +18370,60 @@
       <p:sp>
         <p:nvSpPr>
           <p:cNvPr id="310" name="Google Shape;310;p24"/>
-          <p:cNvSpPr txBox="1"/>
+          <p:cNvSpPr/>
           <p:nvPr/>
         </p:nvSpPr>
         <p:spPr>
           <a:xfrm>
-            <a:off x="912374" y="2737620"/>
-            <a:ext cx="5069016" cy="2828082"/>
-          </a:xfrm>
-          <a:prstGeom prst="rect">
-            <a:avLst/>
+            <a:off x="3208867" y="5050476"/>
+            <a:ext cx="169775" cy="464024"/>
+          </a:xfrm>
+          <a:prstGeom prst="rightBrace">
+            <a:avLst>
+              <a:gd fmla="val 8333" name="adj1"/>
+              <a:gd fmla="val 50000" name="adj2"/>
+            </a:avLst>
           </a:prstGeom>
           <a:noFill/>
-          <a:ln>
-            <a:noFill/>
+          <a:ln cap="flat" cmpd="sng" w="19050">
+            <a:solidFill>
+              <a:srgbClr val="5597D3"/>
+            </a:solidFill>
+            <a:prstDash val="solid"/>
+            <a:round/>
+            <a:headEnd len="sm" w="sm" type="none"/>
+            <a:tailEnd len="sm" w="sm" type="none"/>
           </a:ln>
         </p:spPr>
         <p:txBody>
-          <a:bodyPr anchorCtr="0" anchor="t" bIns="45700" lIns="91425" spcFirstLastPara="1" rIns="91425" wrap="square" tIns="45700">
-            <a:spAutoFit/>
+          <a:bodyPr anchorCtr="0" anchor="ctr" bIns="45700" lIns="91425" spcFirstLastPara="1" rIns="91425" wrap="square" tIns="45700">
+            <a:noAutofit/>
           </a:bodyPr>
           <a:lstStyle/>
           <a:p>
-            <a:pPr indent="0" lvl="0" marL="0" marR="0" rtl="0" algn="l">
-              <a:lnSpc>
-                <a:spcPct val="150000"/>
-              </a:lnSpc>
-              <a:spcBef>
-                <a:spcPts val="0"/>
-              </a:spcBef>
-              <a:spcAft>
-                <a:spcPts val="0"/>
-              </a:spcAft>
-              <a:buClr>
-                <a:srgbClr val="000000"/>
-              </a:buClr>
-              <a:buSzPts val="1200"/>
+            <a:pPr indent="0" lvl="0" marL="0" marR="0" rtl="0" algn="ctr">
+              <a:lnSpc>
+                <a:spcPct val="100000"/>
+              </a:lnSpc>
+              <a:spcBef>
+                <a:spcPts val="0"/>
+              </a:spcBef>
+              <a:spcAft>
+                <a:spcPts val="0"/>
+              </a:spcAft>
+              <a:buClr>
+                <a:srgbClr val="000000"/>
+              </a:buClr>
+              <a:buSzPts val="1400"/>
               <a:buFont typeface="Arial"/>
               <a:buNone/>
             </a:pPr>
             <a:r>
-              <a:rPr b="0" i="0" lang="en-US" sz="1200" u="none" cap="none" strike="noStrike">
-                <a:solidFill>
-                  <a:srgbClr val="2F5496"/>
-                </a:solidFill>
-                <a:latin typeface="Arial"/>
-                <a:ea typeface="Arial"/>
-                <a:cs typeface="Arial"/>
-                <a:sym typeface="Arial"/>
-              </a:rPr>
-              <a:t>booster</a:t>
-            </a:r>
-            <a:r>
-              <a:rPr b="0" i="0" lang="en-US" sz="1200" u="none" cap="none" strike="noStrike">
-                <a:solidFill>
-                  <a:srgbClr val="000000"/>
-                </a:solidFill>
-                <a:latin typeface="Arial"/>
-                <a:ea typeface="Arial"/>
-                <a:cs typeface="Arial"/>
-                <a:sym typeface="Arial"/>
-              </a:rPr>
-              <a:t>: which booster to use.</a:t>
+              <a:t/>
             </a:r>
             <a:endParaRPr b="0" i="0" sz="1400" u="none" cap="none" strike="noStrike">
               <a:solidFill>
-                <a:srgbClr val="000000"/>
-              </a:solidFill>
-              <a:latin typeface="Arial"/>
-              <a:ea typeface="Arial"/>
-              <a:cs typeface="Arial"/>
-              <a:sym typeface="Arial"/>
-            </a:endParaRPr>
-          </a:p>
-          <a:p>
-            <a:pPr indent="0" lvl="0" marL="0" marR="0" rtl="0" algn="l">
-              <a:lnSpc>
-                <a:spcPct val="150000"/>
-              </a:lnSpc>
-              <a:spcBef>
-                <a:spcPts val="0"/>
-              </a:spcBef>
-              <a:spcAft>
-                <a:spcPts val="0"/>
-              </a:spcAft>
-              <a:buClr>
-                <a:srgbClr val="000000"/>
-              </a:buClr>
-              <a:buSzPts val="1200"/>
-              <a:buFont typeface="Arial"/>
-              <a:buNone/>
-            </a:pPr>
-            <a:r>
-              <a:rPr b="0" i="0" lang="en-US" sz="1200" u="none" cap="none" strike="noStrike">
-                <a:solidFill>
-                  <a:srgbClr val="548135"/>
-                </a:solidFill>
-                <a:latin typeface="Arial"/>
-                <a:ea typeface="Arial"/>
-                <a:cs typeface="Arial"/>
-                <a:sym typeface="Arial"/>
-              </a:rPr>
-              <a:t>task</a:t>
-            </a:r>
-            <a:r>
-              <a:rPr b="0" i="0" lang="en-US" sz="1200" u="none" cap="none" strike="noStrike">
-                <a:solidFill>
-                  <a:srgbClr val="000000"/>
-                </a:solidFill>
-                <a:latin typeface="Arial"/>
-                <a:ea typeface="Arial"/>
-                <a:cs typeface="Arial"/>
-                <a:sym typeface="Arial"/>
-              </a:rPr>
-              <a:t>: (train – test)</a:t>
-            </a:r>
-            <a:endParaRPr b="0" i="0" sz="1400" u="none" cap="none" strike="noStrike">
-              <a:solidFill>
-                <a:srgbClr val="000000"/>
-              </a:solidFill>
-              <a:latin typeface="Arial"/>
-              <a:ea typeface="Arial"/>
-              <a:cs typeface="Arial"/>
-              <a:sym typeface="Arial"/>
-            </a:endParaRPr>
-          </a:p>
-          <a:p>
-            <a:pPr indent="0" lvl="0" marL="0" marR="0" rtl="0" algn="l">
-              <a:lnSpc>
-                <a:spcPct val="150000"/>
-              </a:lnSpc>
-              <a:spcBef>
-                <a:spcPts val="0"/>
-              </a:spcBef>
-              <a:spcAft>
-                <a:spcPts val="0"/>
-              </a:spcAft>
-              <a:buClr>
-                <a:srgbClr val="000000"/>
-              </a:buClr>
-              <a:buSzPts val="1200"/>
-              <a:buFont typeface="Arial"/>
-              <a:buNone/>
-            </a:pPr>
-            <a:r>
-              <a:rPr b="0" i="0" lang="en-US" sz="1200" u="none" cap="none" strike="noStrike">
-                <a:solidFill>
-                  <a:srgbClr val="548135"/>
-                </a:solidFill>
-                <a:latin typeface="Arial"/>
-                <a:ea typeface="Arial"/>
-                <a:cs typeface="Arial"/>
-                <a:sym typeface="Arial"/>
-              </a:rPr>
-              <a:t>max_depth</a:t>
-            </a:r>
-            <a:r>
-              <a:rPr b="0" i="0" lang="en-US" sz="1200" u="none" cap="none" strike="noStrike">
-                <a:solidFill>
-                  <a:srgbClr val="000000"/>
-                </a:solidFill>
-                <a:latin typeface="Arial"/>
-                <a:ea typeface="Arial"/>
-                <a:cs typeface="Arial"/>
-                <a:sym typeface="Arial"/>
-              </a:rPr>
-              <a:t>: limit the max depth for a tree.</a:t>
-            </a:r>
-            <a:endParaRPr b="0" i="0" sz="1400" u="none" cap="none" strike="noStrike">
-              <a:solidFill>
-                <a:srgbClr val="000000"/>
-              </a:solidFill>
-              <a:latin typeface="Arial"/>
-              <a:ea typeface="Arial"/>
-              <a:cs typeface="Arial"/>
-              <a:sym typeface="Arial"/>
-            </a:endParaRPr>
-          </a:p>
-          <a:p>
-            <a:pPr indent="0" lvl="0" marL="0" marR="0" rtl="0" algn="l">
-              <a:lnSpc>
-                <a:spcPct val="150000"/>
-              </a:lnSpc>
-              <a:spcBef>
-                <a:spcPts val="0"/>
-              </a:spcBef>
-              <a:spcAft>
-                <a:spcPts val="0"/>
-              </a:spcAft>
-              <a:buClr>
-                <a:srgbClr val="000000"/>
-              </a:buClr>
-              <a:buSzPts val="1200"/>
-              <a:buFont typeface="Arial"/>
-              <a:buNone/>
-            </a:pPr>
-            <a:r>
-              <a:rPr b="0" i="0" lang="en-US" sz="1200" u="none" cap="none" strike="noStrike">
-                <a:solidFill>
-                  <a:srgbClr val="548135"/>
-                </a:solidFill>
-                <a:latin typeface="Arial"/>
-                <a:ea typeface="Arial"/>
-                <a:cs typeface="Arial"/>
-                <a:sym typeface="Arial"/>
-              </a:rPr>
-              <a:t>min_child_weight: </a:t>
-            </a:r>
-            <a:r>
-              <a:rPr b="0" i="0" lang="en-US" sz="1200" u="none" cap="none" strike="noStrike">
-                <a:solidFill>
-                  <a:srgbClr val="000000"/>
-                </a:solidFill>
-                <a:latin typeface="Arial"/>
-                <a:ea typeface="Arial"/>
-                <a:cs typeface="Arial"/>
-                <a:sym typeface="Arial"/>
-              </a:rPr>
-              <a:t>minimum sum of instance weight needed in a child</a:t>
-            </a:r>
-            <a:endParaRPr b="0" i="0" sz="1400" u="none" cap="none" strike="noStrike">
-              <a:solidFill>
-                <a:srgbClr val="000000"/>
-              </a:solidFill>
-              <a:latin typeface="Arial"/>
-              <a:ea typeface="Arial"/>
-              <a:cs typeface="Arial"/>
-              <a:sym typeface="Arial"/>
-            </a:endParaRPr>
-          </a:p>
-          <a:p>
-            <a:pPr indent="0" lvl="0" marL="0" marR="0" rtl="0" algn="l">
-              <a:lnSpc>
-                <a:spcPct val="150000"/>
-              </a:lnSpc>
-              <a:spcBef>
-                <a:spcPts val="0"/>
-              </a:spcBef>
-              <a:spcAft>
-                <a:spcPts val="0"/>
-              </a:spcAft>
-              <a:buClr>
-                <a:srgbClr val="000000"/>
-              </a:buClr>
-              <a:buSzPts val="1200"/>
-              <a:buFont typeface="Arial"/>
-              <a:buNone/>
-            </a:pPr>
-            <a:r>
-              <a:rPr b="0" i="0" lang="en-US" sz="1200" u="none" cap="none" strike="noStrike">
-                <a:solidFill>
-                  <a:srgbClr val="548135"/>
-                </a:solidFill>
-                <a:latin typeface="Arial"/>
-                <a:ea typeface="Arial"/>
-                <a:cs typeface="Arial"/>
-                <a:sym typeface="Arial"/>
-              </a:rPr>
-              <a:t>max_bins</a:t>
-            </a:r>
-            <a:r>
-              <a:rPr b="0" i="0" lang="en-US" sz="1200" u="none" cap="none" strike="noStrike">
-                <a:solidFill>
-                  <a:srgbClr val="000000"/>
-                </a:solidFill>
-                <a:latin typeface="Arial"/>
-                <a:ea typeface="Arial"/>
-                <a:cs typeface="Arial"/>
-                <a:sym typeface="Arial"/>
-              </a:rPr>
-              <a:t>: max number of bins that feature values will be bucketed in</a:t>
-            </a:r>
-            <a:endParaRPr b="0" i="0" sz="1400" u="none" cap="none" strike="noStrike">
-              <a:solidFill>
-                <a:srgbClr val="000000"/>
-              </a:solidFill>
-              <a:latin typeface="Arial"/>
-              <a:ea typeface="Arial"/>
-              <a:cs typeface="Arial"/>
-              <a:sym typeface="Arial"/>
-            </a:endParaRPr>
-          </a:p>
-          <a:p>
-            <a:pPr indent="0" lvl="0" marL="0" marR="0" rtl="0" algn="l">
-              <a:lnSpc>
-                <a:spcPct val="150000"/>
-              </a:lnSpc>
-              <a:spcBef>
-                <a:spcPts val="0"/>
-              </a:spcBef>
-              <a:spcAft>
-                <a:spcPts val="0"/>
-              </a:spcAft>
-              <a:buClr>
-                <a:srgbClr val="000000"/>
-              </a:buClr>
-              <a:buSzPts val="1200"/>
-              <a:buFont typeface="Arial"/>
-              <a:buNone/>
-            </a:pPr>
-            <a:r>
-              <a:rPr b="0" i="0" lang="en-US" sz="1200" u="none" cap="none" strike="noStrike">
-                <a:solidFill>
-                  <a:srgbClr val="548135"/>
-                </a:solidFill>
-                <a:latin typeface="Arial"/>
-                <a:ea typeface="Arial"/>
-                <a:cs typeface="Arial"/>
-                <a:sym typeface="Arial"/>
-              </a:rPr>
-              <a:t>eval_metric</a:t>
-            </a:r>
-            <a:r>
-              <a:rPr b="0" i="0" lang="en-US" sz="1200" u="none" cap="none" strike="noStrike">
-                <a:solidFill>
-                  <a:srgbClr val="000000"/>
-                </a:solidFill>
-                <a:latin typeface="Arial"/>
-                <a:ea typeface="Arial"/>
-                <a:cs typeface="Arial"/>
-                <a:sym typeface="Arial"/>
-              </a:rPr>
-              <a:t>: evaluation metrics for validation data</a:t>
-            </a:r>
-            <a:endParaRPr b="0" i="0" sz="1400" u="none" cap="none" strike="noStrike">
-              <a:solidFill>
-                <a:srgbClr val="000000"/>
-              </a:solidFill>
-              <a:latin typeface="Arial"/>
-              <a:ea typeface="Arial"/>
-              <a:cs typeface="Arial"/>
-              <a:sym typeface="Arial"/>
-            </a:endParaRPr>
-          </a:p>
-          <a:p>
-            <a:pPr indent="0" lvl="0" marL="0" marR="0" rtl="0" algn="l">
-              <a:lnSpc>
-                <a:spcPct val="150000"/>
-              </a:lnSpc>
-              <a:spcBef>
-                <a:spcPts val="0"/>
-              </a:spcBef>
-              <a:spcAft>
-                <a:spcPts val="0"/>
-              </a:spcAft>
-              <a:buClr>
-                <a:srgbClr val="000000"/>
-              </a:buClr>
-              <a:buSzPts val="1200"/>
-              <a:buFont typeface="Arial"/>
-              <a:buNone/>
-            </a:pPr>
-            <a:r>
-              <a:rPr b="0" i="0" lang="en-US" sz="1200" u="none" cap="none" strike="noStrike">
-                <a:solidFill>
-                  <a:srgbClr val="548135"/>
-                </a:solidFill>
-                <a:latin typeface="Arial"/>
-                <a:ea typeface="Arial"/>
-                <a:cs typeface="Arial"/>
-                <a:sym typeface="Arial"/>
-              </a:rPr>
-              <a:t>sample_type: </a:t>
-            </a:r>
-            <a:r>
-              <a:rPr b="0" i="0" lang="en-US" sz="1200" u="none" cap="none" strike="noStrike">
-                <a:solidFill>
-                  <a:srgbClr val="000000"/>
-                </a:solidFill>
-                <a:latin typeface="Arial"/>
-                <a:ea typeface="Arial"/>
-                <a:cs typeface="Arial"/>
-                <a:sym typeface="Arial"/>
-              </a:rPr>
-              <a:t>type of sampling algorithm (uniform – weighted)</a:t>
-            </a:r>
-            <a:endParaRPr b="0" i="0" sz="1400" u="none" cap="none" strike="noStrike">
-              <a:solidFill>
-                <a:srgbClr val="000000"/>
-              </a:solidFill>
-              <a:latin typeface="Arial"/>
-              <a:ea typeface="Arial"/>
-              <a:cs typeface="Arial"/>
-              <a:sym typeface="Arial"/>
-            </a:endParaRPr>
-          </a:p>
-          <a:p>
-            <a:pPr indent="0" lvl="0" marL="0" marR="0" rtl="0" algn="l">
-              <a:lnSpc>
-                <a:spcPct val="150000"/>
-              </a:lnSpc>
-              <a:spcBef>
-                <a:spcPts val="0"/>
-              </a:spcBef>
-              <a:spcAft>
-                <a:spcPts val="0"/>
-              </a:spcAft>
-              <a:buClr>
-                <a:srgbClr val="000000"/>
-              </a:buClr>
-              <a:buSzPts val="1200"/>
-              <a:buFont typeface="Arial"/>
-              <a:buNone/>
-            </a:pPr>
-            <a:r>
-              <a:rPr b="0" i="0" lang="en-US" sz="1200" u="none" cap="none" strike="noStrike">
-                <a:solidFill>
-                  <a:srgbClr val="548135"/>
-                </a:solidFill>
-                <a:latin typeface="Arial"/>
-                <a:ea typeface="Arial"/>
-                <a:cs typeface="Arial"/>
-                <a:sym typeface="Arial"/>
-              </a:rPr>
-              <a:t>normalize_type</a:t>
-            </a:r>
-            <a:r>
-              <a:rPr b="0" i="0" lang="en-US" sz="1200" u="none" cap="none" strike="noStrike">
-                <a:solidFill>
-                  <a:srgbClr val="000000"/>
-                </a:solidFill>
-                <a:latin typeface="Arial"/>
-                <a:ea typeface="Arial"/>
-                <a:cs typeface="Arial"/>
-                <a:sym typeface="Arial"/>
-              </a:rPr>
-              <a:t>: type of normalization algorithm (based on learning rate)</a:t>
-            </a:r>
-            <a:endParaRPr b="0" i="0" sz="1400" u="none" cap="none" strike="noStrike">
-              <a:solidFill>
-                <a:srgbClr val="000000"/>
-              </a:solidFill>
-              <a:latin typeface="Arial"/>
-              <a:ea typeface="Arial"/>
-              <a:cs typeface="Arial"/>
-              <a:sym typeface="Arial"/>
-            </a:endParaRPr>
-          </a:p>
-          <a:p>
-            <a:pPr indent="0" lvl="0" marL="0" marR="0" rtl="0" algn="l">
-              <a:lnSpc>
-                <a:spcPct val="150000"/>
-              </a:lnSpc>
-              <a:spcBef>
-                <a:spcPts val="0"/>
-              </a:spcBef>
-              <a:spcAft>
-                <a:spcPts val="0"/>
-              </a:spcAft>
-              <a:buClr>
-                <a:srgbClr val="000000"/>
-              </a:buClr>
-              <a:buSzPts val="1200"/>
-              <a:buFont typeface="Arial"/>
-              <a:buNone/>
-            </a:pPr>
-            <a:r>
-              <a:rPr b="0" i="0" lang="en-US" sz="1200" u="none" cap="none" strike="noStrike">
-                <a:solidFill>
-                  <a:srgbClr val="548135"/>
-                </a:solidFill>
-                <a:latin typeface="Arial"/>
-                <a:ea typeface="Arial"/>
-                <a:cs typeface="Arial"/>
-                <a:sym typeface="Arial"/>
-              </a:rPr>
-              <a:t>reg_lambda</a:t>
-            </a:r>
-            <a:r>
-              <a:rPr b="0" i="0" lang="en-US" sz="1200" u="none" cap="none" strike="noStrike">
-                <a:solidFill>
-                  <a:srgbClr val="000000"/>
-                </a:solidFill>
-                <a:latin typeface="Arial"/>
-                <a:ea typeface="Arial"/>
-                <a:cs typeface="Arial"/>
-                <a:sym typeface="Arial"/>
-              </a:rPr>
-              <a:t>: L2 regularization</a:t>
-            </a:r>
-            <a:endParaRPr b="0" i="0" sz="1400" u="none" cap="none" strike="noStrike">
-              <a:solidFill>
-                <a:srgbClr val="000000"/>
-              </a:solidFill>
-              <a:latin typeface="Arial"/>
-              <a:ea typeface="Arial"/>
-              <a:cs typeface="Arial"/>
-              <a:sym typeface="Arial"/>
-            </a:endParaRPr>
-          </a:p>
-          <a:p>
-            <a:pPr indent="0" lvl="0" marL="0" marR="0" rtl="0" algn="l">
-              <a:lnSpc>
-                <a:spcPct val="150000"/>
-              </a:lnSpc>
-              <a:spcBef>
-                <a:spcPts val="0"/>
-              </a:spcBef>
-              <a:spcAft>
-                <a:spcPts val="0"/>
-              </a:spcAft>
-              <a:buClr>
-                <a:srgbClr val="000000"/>
-              </a:buClr>
-              <a:buSzPts val="1200"/>
-              <a:buFont typeface="Arial"/>
-              <a:buNone/>
-            </a:pPr>
-            <a:r>
-              <a:rPr b="0" i="0" lang="en-US" sz="1200" u="none" cap="none" strike="noStrike">
-                <a:solidFill>
-                  <a:srgbClr val="548135"/>
-                </a:solidFill>
-                <a:latin typeface="Arial"/>
-                <a:ea typeface="Arial"/>
-                <a:cs typeface="Arial"/>
-                <a:sym typeface="Arial"/>
-              </a:rPr>
-              <a:t>reg_alpha</a:t>
-            </a:r>
-            <a:r>
-              <a:rPr b="0" i="0" lang="en-US" sz="1200" u="none" cap="none" strike="noStrike">
-                <a:solidFill>
-                  <a:srgbClr val="000000"/>
-                </a:solidFill>
-                <a:latin typeface="Arial"/>
-                <a:ea typeface="Arial"/>
-                <a:cs typeface="Arial"/>
-                <a:sym typeface="Arial"/>
-              </a:rPr>
-              <a:t>: L1 regularization</a:t>
-            </a:r>
-            <a:endParaRPr b="0" i="0" sz="1400" u="none" cap="none" strike="noStrike">
-              <a:solidFill>
-                <a:srgbClr val="000000"/>
+                <a:schemeClr val="dk1"/>
               </a:solidFill>
               <a:latin typeface="Arial"/>
               <a:ea typeface="Arial"/>
@@ -18491,8 +18441,8 @@
         </p:nvSpPr>
         <p:spPr>
           <a:xfrm>
-            <a:off x="3208867" y="5050476"/>
-            <a:ext cx="169775" cy="464024"/>
+            <a:off x="5829731" y="3215609"/>
+            <a:ext cx="761761" cy="687651"/>
           </a:xfrm>
           <a:prstGeom prst="rightBrace">
             <a:avLst>
@@ -18501,7 +18451,7 @@
             </a:avLst>
           </a:prstGeom>
           <a:noFill/>
-          <a:ln cap="flat" cmpd="sng" w="19050">
+          <a:ln cap="flat" cmpd="sng" w="28575">
             <a:solidFill>
               <a:srgbClr val="5597D3"/>
             </a:solidFill>
@@ -18552,72 +18502,6 @@
       <p:sp>
         <p:nvSpPr>
           <p:cNvPr id="312" name="Google Shape;312;p24"/>
-          <p:cNvSpPr/>
-          <p:nvPr/>
-        </p:nvSpPr>
-        <p:spPr>
-          <a:xfrm>
-            <a:off x="5829731" y="3215609"/>
-            <a:ext cx="761761" cy="687651"/>
-          </a:xfrm>
-          <a:prstGeom prst="rightBrace">
-            <a:avLst>
-              <a:gd fmla="val 8333" name="adj1"/>
-              <a:gd fmla="val 50000" name="adj2"/>
-            </a:avLst>
-          </a:prstGeom>
-          <a:noFill/>
-          <a:ln cap="flat" cmpd="sng" w="28575">
-            <a:solidFill>
-              <a:srgbClr val="5597D3"/>
-            </a:solidFill>
-            <a:prstDash val="solid"/>
-            <a:round/>
-            <a:headEnd len="sm" w="sm" type="none"/>
-            <a:tailEnd len="sm" w="sm" type="none"/>
-          </a:ln>
-        </p:spPr>
-        <p:txBody>
-          <a:bodyPr anchorCtr="0" anchor="ctr" bIns="45700" lIns="91425" spcFirstLastPara="1" rIns="91425" wrap="square" tIns="45700">
-            <a:noAutofit/>
-          </a:bodyPr>
-          <a:lstStyle/>
-          <a:p>
-            <a:pPr indent="0" lvl="0" marL="0" marR="0" rtl="0" algn="ctr">
-              <a:lnSpc>
-                <a:spcPct val="100000"/>
-              </a:lnSpc>
-              <a:spcBef>
-                <a:spcPts val="0"/>
-              </a:spcBef>
-              <a:spcAft>
-                <a:spcPts val="0"/>
-              </a:spcAft>
-              <a:buClr>
-                <a:srgbClr val="000000"/>
-              </a:buClr>
-              <a:buSzPts val="1400"/>
-              <a:buFont typeface="Arial"/>
-              <a:buNone/>
-            </a:pPr>
-            <a:r>
-              <a:t/>
-            </a:r>
-            <a:endParaRPr b="0" i="0" sz="1400" u="none" cap="none" strike="noStrike">
-              <a:solidFill>
-                <a:schemeClr val="dk1"/>
-              </a:solidFill>
-              <a:latin typeface="Arial"/>
-              <a:ea typeface="Arial"/>
-              <a:cs typeface="Arial"/>
-              <a:sym typeface="Arial"/>
-            </a:endParaRPr>
-          </a:p>
-        </p:txBody>
-      </p:sp>
-      <p:sp>
-        <p:nvSpPr>
-          <p:cNvPr id="313" name="Google Shape;313;p24"/>
           <p:cNvSpPr txBox="1"/>
           <p:nvPr/>
         </p:nvSpPr>
@@ -18795,7 +18679,7 @@
       </p:sp>
       <p:cxnSp>
         <p:nvCxnSpPr>
-          <p:cNvPr id="314" name="Google Shape;314;p24"/>
+          <p:cNvPr id="313" name="Google Shape;313;p24"/>
           <p:cNvCxnSpPr/>
           <p:nvPr/>
         </p:nvCxnSpPr>
@@ -18821,7 +18705,7 @@
       </p:cxnSp>
       <p:sp>
         <p:nvSpPr>
-          <p:cNvPr id="315" name="Google Shape;315;p24"/>
+          <p:cNvPr id="314" name="Google Shape;314;p24"/>
           <p:cNvSpPr txBox="1"/>
           <p:nvPr/>
         </p:nvSpPr>
@@ -18887,7 +18771,7 @@
       </p:sp>
       <p:sp>
         <p:nvSpPr>
-          <p:cNvPr id="316" name="Google Shape;316;p24"/>
+          <p:cNvPr id="315" name="Google Shape;315;p24"/>
           <p:cNvSpPr txBox="1"/>
           <p:nvPr/>
         </p:nvSpPr>
@@ -18948,116 +18832,6 @@
               <a:cs typeface="Arial"/>
               <a:sym typeface="Arial"/>
             </a:endParaRPr>
-          </a:p>
-        </p:txBody>
-      </p:sp>
-      <p:sp>
-        <p:nvSpPr>
-          <p:cNvPr id="317" name="Google Shape;317;p24"/>
-          <p:cNvSpPr txBox="1"/>
-          <p:nvPr/>
-        </p:nvSpPr>
-        <p:spPr>
-          <a:xfrm>
-            <a:off x="3988025" y="345775"/>
-            <a:ext cx="3000000" cy="957000"/>
-          </a:xfrm>
-          <a:prstGeom prst="rect">
-            <a:avLst/>
-          </a:prstGeom>
-          <a:noFill/>
-          <a:ln>
-            <a:noFill/>
-          </a:ln>
-        </p:spPr>
-        <p:txBody>
-          <a:bodyPr anchorCtr="0" anchor="t" bIns="91425" lIns="91425" spcFirstLastPara="1" rIns="91425" wrap="square" tIns="91425">
-            <a:spAutoFit/>
-          </a:bodyPr>
-          <a:lstStyle/>
-          <a:p>
-            <a:pPr indent="-304800" lvl="0" marL="457200" rtl="0" algn="l">
-              <a:lnSpc>
-                <a:spcPct val="115000"/>
-              </a:lnSpc>
-              <a:spcBef>
-                <a:spcPts val="1500"/>
-              </a:spcBef>
-              <a:spcAft>
-                <a:spcPts val="0"/>
-              </a:spcAft>
-              <a:buClr>
-                <a:srgbClr val="374151"/>
-              </a:buClr>
-              <a:buSzPts val="1200"/>
-              <a:buFont typeface="Roboto"/>
-              <a:buChar char="●"/>
-            </a:pPr>
-            <a:r>
-              <a:t/>
-            </a:r>
-            <a:endParaRPr sz="1050">
-              <a:solidFill>
-                <a:srgbClr val="188038"/>
-              </a:solidFill>
-              <a:highlight>
-                <a:srgbClr val="F7F7F8"/>
-              </a:highlight>
-              <a:latin typeface="Courier New"/>
-              <a:ea typeface="Courier New"/>
-              <a:cs typeface="Courier New"/>
-              <a:sym typeface="Courier New"/>
-            </a:endParaRPr>
-          </a:p>
-          <a:p>
-            <a:pPr indent="-304800" lvl="0" marL="457200" rtl="0" algn="l">
-              <a:lnSpc>
-                <a:spcPct val="115000"/>
-              </a:lnSpc>
-              <a:spcBef>
-                <a:spcPts val="0"/>
-              </a:spcBef>
-              <a:spcAft>
-                <a:spcPts val="0"/>
-              </a:spcAft>
-              <a:buClr>
-                <a:srgbClr val="374151"/>
-              </a:buClr>
-              <a:buSzPts val="1200"/>
-              <a:buFont typeface="Roboto"/>
-              <a:buChar char="●"/>
-            </a:pPr>
-            <a:r>
-              <a:rPr lang="en-US" sz="1200">
-                <a:solidFill>
-                  <a:srgbClr val="374151"/>
-                </a:solidFill>
-                <a:highlight>
-                  <a:srgbClr val="F7F7F8"/>
-                </a:highlight>
-                <a:latin typeface="Roboto"/>
-                <a:ea typeface="Roboto"/>
-                <a:cs typeface="Roboto"/>
-                <a:sym typeface="Roboto"/>
-              </a:rPr>
-              <a:t>XGBClassifier: </a:t>
-            </a:r>
-            <a:r>
-              <a:rPr lang="en-US" sz="1050">
-                <a:solidFill>
-                  <a:srgbClr val="188038"/>
-                </a:solidFill>
-                <a:highlight>
-                  <a:srgbClr val="F7F7F8"/>
-                </a:highlight>
-                <a:latin typeface="Courier New"/>
-                <a:ea typeface="Courier New"/>
-                <a:cs typeface="Courier New"/>
-                <a:sym typeface="Courier New"/>
-              </a:rPr>
-              <a:t>{'subsample': 1, 'n_estimators': 200, 'learning_rate': 0.1}</a:t>
-            </a:r>
-            <a:endParaRPr/>
           </a:p>
         </p:txBody>
       </p:sp>
@@ -19074,7 +18848,7 @@
   <p:cSld>
     <p:spTree>
       <p:nvGrpSpPr>
-        <p:cNvPr id="322" name="Shape 322"/>
+        <p:cNvPr id="320" name="Shape 320"/>
         <p:cNvGrpSpPr/>
         <p:nvPr/>
       </p:nvGrpSpPr>
@@ -19088,7 +18862,7 @@
       </p:grpSpPr>
       <p:sp>
         <p:nvSpPr>
-          <p:cNvPr id="323" name="Google Shape;323;p25"/>
+          <p:cNvPr id="321" name="Google Shape;321;p25"/>
           <p:cNvSpPr txBox="1"/>
           <p:nvPr>
             <p:ph idx="12" type="sldNum"/>
@@ -19140,7 +18914,7 @@
       </p:sp>
       <p:sp>
         <p:nvSpPr>
-          <p:cNvPr id="324" name="Google Shape;324;p25"/>
+          <p:cNvPr id="322" name="Google Shape;322;p25"/>
           <p:cNvSpPr txBox="1"/>
           <p:nvPr/>
         </p:nvSpPr>
@@ -19195,6 +18969,138 @@
             <a:endParaRPr b="1" i="0" sz="2700" u="none" cap="none" strike="noStrike">
               <a:solidFill>
                 <a:srgbClr val="0D5486"/>
+              </a:solidFill>
+              <a:latin typeface="Arial"/>
+              <a:ea typeface="Arial"/>
+              <a:cs typeface="Arial"/>
+              <a:sym typeface="Arial"/>
+            </a:endParaRPr>
+          </a:p>
+        </p:txBody>
+      </p:sp>
+      <p:sp>
+        <p:nvSpPr>
+          <p:cNvPr id="323" name="Google Shape;323;p25"/>
+          <p:cNvSpPr txBox="1"/>
+          <p:nvPr/>
+        </p:nvSpPr>
+        <p:spPr>
+          <a:xfrm>
+            <a:off x="7822237" y="192699"/>
+            <a:ext cx="4924772" cy="400110"/>
+          </a:xfrm>
+          <a:prstGeom prst="rect">
+            <a:avLst/>
+          </a:prstGeom>
+          <a:noFill/>
+          <a:ln>
+            <a:noFill/>
+          </a:ln>
+        </p:spPr>
+        <p:txBody>
+          <a:bodyPr anchorCtr="0" anchor="t" bIns="45700" lIns="108000" spcFirstLastPara="1" rIns="108000" wrap="square" tIns="45700">
+            <a:spAutoFit/>
+          </a:bodyPr>
+          <a:lstStyle/>
+          <a:p>
+            <a:pPr indent="0" lvl="0" marL="0" marR="0" rtl="0" algn="l">
+              <a:lnSpc>
+                <a:spcPct val="100000"/>
+              </a:lnSpc>
+              <a:spcBef>
+                <a:spcPts val="0"/>
+              </a:spcBef>
+              <a:spcAft>
+                <a:spcPts val="0"/>
+              </a:spcAft>
+              <a:buClr>
+                <a:srgbClr val="000000"/>
+              </a:buClr>
+              <a:buSzPts val="2000"/>
+              <a:buFont typeface="Arial"/>
+              <a:buNone/>
+            </a:pPr>
+            <a:r>
+              <a:rPr b="1" i="0" lang="en-US" sz="2000" u="none" cap="none" strike="noStrike">
+                <a:solidFill>
+                  <a:srgbClr val="0D5486"/>
+                </a:solidFill>
+                <a:latin typeface="Arial"/>
+                <a:ea typeface="Arial"/>
+                <a:cs typeface="Arial"/>
+                <a:sym typeface="Arial"/>
+              </a:rPr>
+              <a:t>03. Comparación de Modelos</a:t>
+            </a:r>
+            <a:endParaRPr b="1" i="0" sz="2000" u="none" cap="none" strike="noStrike">
+              <a:solidFill>
+                <a:srgbClr val="0D5486"/>
+              </a:solidFill>
+              <a:latin typeface="Arial"/>
+              <a:ea typeface="Arial"/>
+              <a:cs typeface="Arial"/>
+              <a:sym typeface="Arial"/>
+            </a:endParaRPr>
+          </a:p>
+        </p:txBody>
+      </p:sp>
+      <p:sp>
+        <p:nvSpPr>
+          <p:cNvPr id="324" name="Google Shape;324;p25"/>
+          <p:cNvSpPr txBox="1"/>
+          <p:nvPr/>
+        </p:nvSpPr>
+        <p:spPr>
+          <a:xfrm>
+            <a:off x="2687849" y="1522388"/>
+            <a:ext cx="3415500" cy="338700"/>
+          </a:xfrm>
+          <a:prstGeom prst="rect">
+            <a:avLst/>
+          </a:prstGeom>
+          <a:noFill/>
+          <a:ln>
+            <a:noFill/>
+          </a:ln>
+        </p:spPr>
+        <p:txBody>
+          <a:bodyPr anchorCtr="0" anchor="t" bIns="45700" lIns="108000" spcFirstLastPara="1" rIns="108000" wrap="square" tIns="45700">
+            <a:spAutoFit/>
+          </a:bodyPr>
+          <a:lstStyle/>
+          <a:p>
+            <a:pPr indent="0" lvl="0" marL="0" marR="0" rtl="0" algn="ctr">
+              <a:lnSpc>
+                <a:spcPct val="100000"/>
+              </a:lnSpc>
+              <a:spcBef>
+                <a:spcPts val="0"/>
+              </a:spcBef>
+              <a:spcAft>
+                <a:spcPts val="0"/>
+              </a:spcAft>
+              <a:buClr>
+                <a:srgbClr val="000000"/>
+              </a:buClr>
+              <a:buSzPts val="1600"/>
+              <a:buFont typeface="Arial"/>
+              <a:buNone/>
+            </a:pPr>
+            <a:r>
+              <a:rPr b="1" i="0" lang="en-US" sz="1600" u="none" cap="none" strike="noStrike">
+                <a:solidFill>
+                  <a:srgbClr val="757070"/>
+                </a:solidFill>
+                <a:latin typeface="Arial"/>
+                <a:ea typeface="Arial"/>
+                <a:cs typeface="Arial"/>
+                <a:sym typeface="Arial"/>
+              </a:rPr>
+              <a:t>Regresión logística</a:t>
+            </a:r>
+            <a:endParaRPr b="1" i="0" sz="2300" u="none" cap="none" strike="noStrike">
+              <a:solidFill>
+                <a:srgbClr val="757070"/>
               </a:solidFill>
               <a:latin typeface="Arial"/>
               <a:ea typeface="Arial"/>
@@ -19212,8 +19118,8 @@
         </p:nvSpPr>
         <p:spPr>
           <a:xfrm>
-            <a:off x="7822237" y="192699"/>
-            <a:ext cx="4924772" cy="400110"/>
+            <a:off x="7071832" y="1478832"/>
+            <a:ext cx="2307900" cy="338700"/>
           </a:xfrm>
           <a:prstGeom prst="rect">
             <a:avLst/>
@@ -19242,25 +19148,25 @@
               <a:buClr>
                 <a:srgbClr val="000000"/>
               </a:buClr>
-              <a:buSzPts val="2000"/>
+              <a:buSzPts val="1600"/>
               <a:buFont typeface="Arial"/>
               <a:buNone/>
             </a:pPr>
             <a:r>
-              <a:rPr b="1" i="0" lang="en-US" sz="2000" u="none" cap="none" strike="noStrike">
-                <a:solidFill>
-                  <a:srgbClr val="0D5486"/>
+              <a:rPr b="1" i="0" lang="en-US" sz="1600" u="none" cap="none" strike="noStrike">
+                <a:solidFill>
+                  <a:srgbClr val="757070"/>
                 </a:solidFill>
                 <a:latin typeface="Arial"/>
                 <a:ea typeface="Arial"/>
                 <a:cs typeface="Arial"/>
                 <a:sym typeface="Arial"/>
               </a:rPr>
-              <a:t>03. Comparación de Modelos</a:t>
-            </a:r>
-            <a:endParaRPr b="1" i="0" sz="2000" u="none" cap="none" strike="noStrike">
+              <a:t>Random Forest</a:t>
+            </a:r>
+            <a:endParaRPr b="1" i="0" sz="2300" u="none" cap="none" strike="noStrike">
               <a:solidFill>
-                <a:srgbClr val="0D5486"/>
+                <a:srgbClr val="757070"/>
               </a:solidFill>
               <a:latin typeface="Arial"/>
               <a:ea typeface="Arial"/>
@@ -19278,8 +19184,8 @@
         </p:nvSpPr>
         <p:spPr>
           <a:xfrm>
-            <a:off x="2687849" y="1522388"/>
-            <a:ext cx="3415500" cy="338700"/>
+            <a:off x="7278052" y="4064455"/>
+            <a:ext cx="1895400" cy="338700"/>
           </a:xfrm>
           <a:prstGeom prst="rect">
             <a:avLst/>
@@ -19322,7 +19228,7 @@
                 <a:cs typeface="Arial"/>
                 <a:sym typeface="Arial"/>
               </a:rPr>
-              <a:t>Regresión logística</a:t>
+              <a:t>XG Boost</a:t>
             </a:r>
             <a:endParaRPr b="1" i="0" sz="2300" u="none" cap="none" strike="noStrike">
               <a:solidFill>
@@ -19344,138 +19250,6 @@
         </p:nvSpPr>
         <p:spPr>
           <a:xfrm>
-            <a:off x="7071832" y="1478832"/>
-            <a:ext cx="2307900" cy="338700"/>
-          </a:xfrm>
-          <a:prstGeom prst="rect">
-            <a:avLst/>
-          </a:prstGeom>
-          <a:noFill/>
-          <a:ln>
-            <a:noFill/>
-          </a:ln>
-        </p:spPr>
-        <p:txBody>
-          <a:bodyPr anchorCtr="0" anchor="t" bIns="45700" lIns="108000" spcFirstLastPara="1" rIns="108000" wrap="square" tIns="45700">
-            <a:spAutoFit/>
-          </a:bodyPr>
-          <a:lstStyle/>
-          <a:p>
-            <a:pPr indent="0" lvl="0" marL="0" marR="0" rtl="0" algn="l">
-              <a:lnSpc>
-                <a:spcPct val="100000"/>
-              </a:lnSpc>
-              <a:spcBef>
-                <a:spcPts val="0"/>
-              </a:spcBef>
-              <a:spcAft>
-                <a:spcPts val="0"/>
-              </a:spcAft>
-              <a:buClr>
-                <a:srgbClr val="000000"/>
-              </a:buClr>
-              <a:buSzPts val="1600"/>
-              <a:buFont typeface="Arial"/>
-              <a:buNone/>
-            </a:pPr>
-            <a:r>
-              <a:rPr b="1" i="0" lang="en-US" sz="1600" u="none" cap="none" strike="noStrike">
-                <a:solidFill>
-                  <a:srgbClr val="757070"/>
-                </a:solidFill>
-                <a:latin typeface="Arial"/>
-                <a:ea typeface="Arial"/>
-                <a:cs typeface="Arial"/>
-                <a:sym typeface="Arial"/>
-              </a:rPr>
-              <a:t>Random Forest</a:t>
-            </a:r>
-            <a:endParaRPr b="1" i="0" sz="2300" u="none" cap="none" strike="noStrike">
-              <a:solidFill>
-                <a:srgbClr val="757070"/>
-              </a:solidFill>
-              <a:latin typeface="Arial"/>
-              <a:ea typeface="Arial"/>
-              <a:cs typeface="Arial"/>
-              <a:sym typeface="Arial"/>
-            </a:endParaRPr>
-          </a:p>
-        </p:txBody>
-      </p:sp>
-      <p:sp>
-        <p:nvSpPr>
-          <p:cNvPr id="328" name="Google Shape;328;p25"/>
-          <p:cNvSpPr txBox="1"/>
-          <p:nvPr/>
-        </p:nvSpPr>
-        <p:spPr>
-          <a:xfrm>
-            <a:off x="7278052" y="4064455"/>
-            <a:ext cx="1895400" cy="338700"/>
-          </a:xfrm>
-          <a:prstGeom prst="rect">
-            <a:avLst/>
-          </a:prstGeom>
-          <a:noFill/>
-          <a:ln>
-            <a:noFill/>
-          </a:ln>
-        </p:spPr>
-        <p:txBody>
-          <a:bodyPr anchorCtr="0" anchor="t" bIns="45700" lIns="108000" spcFirstLastPara="1" rIns="108000" wrap="square" tIns="45700">
-            <a:spAutoFit/>
-          </a:bodyPr>
-          <a:lstStyle/>
-          <a:p>
-            <a:pPr indent="0" lvl="0" marL="0" marR="0" rtl="0" algn="ctr">
-              <a:lnSpc>
-                <a:spcPct val="100000"/>
-              </a:lnSpc>
-              <a:spcBef>
-                <a:spcPts val="0"/>
-              </a:spcBef>
-              <a:spcAft>
-                <a:spcPts val="0"/>
-              </a:spcAft>
-              <a:buClr>
-                <a:srgbClr val="000000"/>
-              </a:buClr>
-              <a:buSzPts val="1600"/>
-              <a:buFont typeface="Arial"/>
-              <a:buNone/>
-            </a:pPr>
-            <a:r>
-              <a:rPr b="1" i="0" lang="en-US" sz="1600" u="none" cap="none" strike="noStrike">
-                <a:solidFill>
-                  <a:srgbClr val="757070"/>
-                </a:solidFill>
-                <a:latin typeface="Arial"/>
-                <a:ea typeface="Arial"/>
-                <a:cs typeface="Arial"/>
-                <a:sym typeface="Arial"/>
-              </a:rPr>
-              <a:t>XG Boost</a:t>
-            </a:r>
-            <a:endParaRPr b="1" i="0" sz="2300" u="none" cap="none" strike="noStrike">
-              <a:solidFill>
-                <a:srgbClr val="757070"/>
-              </a:solidFill>
-              <a:latin typeface="Arial"/>
-              <a:ea typeface="Arial"/>
-              <a:cs typeface="Arial"/>
-              <a:sym typeface="Arial"/>
-            </a:endParaRPr>
-          </a:p>
-        </p:txBody>
-      </p:sp>
-      <p:sp>
-        <p:nvSpPr>
-          <p:cNvPr id="329" name="Google Shape;329;p25"/>
-          <p:cNvSpPr txBox="1"/>
-          <p:nvPr/>
-        </p:nvSpPr>
-        <p:spPr>
-          <a:xfrm>
             <a:off x="3424709" y="3980750"/>
             <a:ext cx="1550100" cy="338700"/>
           </a:xfrm>
@@ -19536,7 +19310,7 @@
       </p:sp>
       <p:pic>
         <p:nvPicPr>
-          <p:cNvPr id="330" name="Google Shape;330;p25"/>
+          <p:cNvPr id="328" name="Google Shape;328;p25"/>
           <p:cNvPicPr preferRelativeResize="0"/>
           <p:nvPr/>
         </p:nvPicPr>
@@ -19563,7 +19337,7 @@
       </p:pic>
       <p:pic>
         <p:nvPicPr>
-          <p:cNvPr id="331" name="Google Shape;331;p25"/>
+          <p:cNvPr id="329" name="Google Shape;329;p25"/>
           <p:cNvPicPr preferRelativeResize="0"/>
           <p:nvPr/>
         </p:nvPicPr>
@@ -19590,7 +19364,7 @@
       </p:pic>
       <p:pic>
         <p:nvPicPr>
-          <p:cNvPr id="332" name="Google Shape;332;p25"/>
+          <p:cNvPr id="330" name="Google Shape;330;p25"/>
           <p:cNvPicPr preferRelativeResize="0"/>
           <p:nvPr/>
         </p:nvPicPr>
@@ -19617,7 +19391,7 @@
       </p:pic>
       <p:pic>
         <p:nvPicPr>
-          <p:cNvPr id="333" name="Google Shape;333;p25"/>
+          <p:cNvPr id="331" name="Google Shape;331;p25"/>
           <p:cNvPicPr preferRelativeResize="0"/>
           <p:nvPr/>
         </p:nvPicPr>
@@ -19644,7 +19418,7 @@
       </p:pic>
       <p:sp>
         <p:nvSpPr>
-          <p:cNvPr id="334" name="Google Shape;334;p25"/>
+          <p:cNvPr id="332" name="Google Shape;332;p25"/>
           <p:cNvSpPr txBox="1"/>
           <p:nvPr/>
         </p:nvSpPr>
@@ -19714,7 +19488,7 @@
       </p:sp>
       <p:sp>
         <p:nvSpPr>
-          <p:cNvPr id="335" name="Google Shape;335;p25"/>
+          <p:cNvPr id="333" name="Google Shape;333;p25"/>
           <p:cNvSpPr txBox="1"/>
           <p:nvPr/>
         </p:nvSpPr>
@@ -20836,7 +20610,7 @@
   <p:cSld>
     <p:spTree>
       <p:nvGrpSpPr>
-        <p:cNvPr id="340" name="Shape 340"/>
+        <p:cNvPr id="338" name="Shape 338"/>
         <p:cNvGrpSpPr/>
         <p:nvPr/>
       </p:nvGrpSpPr>
@@ -20850,7 +20624,7 @@
       </p:grpSpPr>
       <p:sp>
         <p:nvSpPr>
-          <p:cNvPr id="341" name="Google Shape;341;p26"/>
+          <p:cNvPr id="339" name="Google Shape;339;p26"/>
           <p:cNvSpPr txBox="1"/>
           <p:nvPr/>
         </p:nvSpPr>
@@ -20905,6 +20679,138 @@
             <a:endParaRPr b="1" i="0" sz="2000" u="none" cap="none" strike="noStrike">
               <a:solidFill>
                 <a:srgbClr val="0D5486"/>
+              </a:solidFill>
+              <a:latin typeface="Arial"/>
+              <a:ea typeface="Arial"/>
+              <a:cs typeface="Arial"/>
+              <a:sym typeface="Arial"/>
+            </a:endParaRPr>
+          </a:p>
+        </p:txBody>
+      </p:sp>
+      <p:sp>
+        <p:nvSpPr>
+          <p:cNvPr id="340" name="Google Shape;340;p26"/>
+          <p:cNvSpPr txBox="1"/>
+          <p:nvPr/>
+        </p:nvSpPr>
+        <p:spPr>
+          <a:xfrm>
+            <a:off x="789544" y="1170535"/>
+            <a:ext cx="7592456" cy="507831"/>
+          </a:xfrm>
+          <a:prstGeom prst="rect">
+            <a:avLst/>
+          </a:prstGeom>
+          <a:noFill/>
+          <a:ln>
+            <a:noFill/>
+          </a:ln>
+        </p:spPr>
+        <p:txBody>
+          <a:bodyPr anchorCtr="0" anchor="t" bIns="45700" lIns="108000" spcFirstLastPara="1" rIns="108000" wrap="square" tIns="45700">
+            <a:spAutoFit/>
+          </a:bodyPr>
+          <a:lstStyle/>
+          <a:p>
+            <a:pPr indent="0" lvl="0" marL="0" marR="0" rtl="0" algn="l">
+              <a:lnSpc>
+                <a:spcPct val="100000"/>
+              </a:lnSpc>
+              <a:spcBef>
+                <a:spcPts val="0"/>
+              </a:spcBef>
+              <a:spcAft>
+                <a:spcPts val="0"/>
+              </a:spcAft>
+              <a:buClr>
+                <a:srgbClr val="000000"/>
+              </a:buClr>
+              <a:buSzPts val="2700"/>
+              <a:buFont typeface="Arial"/>
+              <a:buNone/>
+            </a:pPr>
+            <a:r>
+              <a:rPr b="1" i="0" lang="en-US" sz="2700" u="none" cap="none" strike="noStrike">
+                <a:solidFill>
+                  <a:srgbClr val="0D5486"/>
+                </a:solidFill>
+                <a:latin typeface="Arial"/>
+                <a:ea typeface="Arial"/>
+                <a:cs typeface="Arial"/>
+                <a:sym typeface="Arial"/>
+              </a:rPr>
+              <a:t>Comparación de Métricas</a:t>
+            </a:r>
+            <a:endParaRPr b="1" i="0" sz="2700" u="none" cap="none" strike="noStrike">
+              <a:solidFill>
+                <a:srgbClr val="0D5486"/>
+              </a:solidFill>
+              <a:latin typeface="Arial"/>
+              <a:ea typeface="Arial"/>
+              <a:cs typeface="Arial"/>
+              <a:sym typeface="Arial"/>
+            </a:endParaRPr>
+          </a:p>
+        </p:txBody>
+      </p:sp>
+      <p:sp>
+        <p:nvSpPr>
+          <p:cNvPr id="341" name="Google Shape;341;p26"/>
+          <p:cNvSpPr txBox="1"/>
+          <p:nvPr/>
+        </p:nvSpPr>
+        <p:spPr>
+          <a:xfrm>
+            <a:off x="285325" y="1678375"/>
+            <a:ext cx="2696100" cy="400200"/>
+          </a:xfrm>
+          <a:prstGeom prst="rect">
+            <a:avLst/>
+          </a:prstGeom>
+          <a:noFill/>
+          <a:ln>
+            <a:noFill/>
+          </a:ln>
+        </p:spPr>
+        <p:txBody>
+          <a:bodyPr anchorCtr="0" anchor="t" bIns="45700" lIns="108000" spcFirstLastPara="1" rIns="108000" wrap="square" tIns="45700">
+            <a:spAutoFit/>
+          </a:bodyPr>
+          <a:lstStyle/>
+          <a:p>
+            <a:pPr indent="0" lvl="0" marL="0" marR="0" rtl="0" algn="ctr">
+              <a:lnSpc>
+                <a:spcPct val="100000"/>
+              </a:lnSpc>
+              <a:spcBef>
+                <a:spcPts val="0"/>
+              </a:spcBef>
+              <a:spcAft>
+                <a:spcPts val="0"/>
+              </a:spcAft>
+              <a:buClr>
+                <a:srgbClr val="000000"/>
+              </a:buClr>
+              <a:buSzPts val="2000"/>
+              <a:buFont typeface="Arial"/>
+              <a:buNone/>
+            </a:pPr>
+            <a:r>
+              <a:rPr b="1" i="0" lang="en-US" sz="2000" u="none" cap="none" strike="noStrike">
+                <a:solidFill>
+                  <a:srgbClr val="757070"/>
+                </a:solidFill>
+                <a:latin typeface="Arial"/>
+                <a:ea typeface="Arial"/>
+                <a:cs typeface="Arial"/>
+                <a:sym typeface="Arial"/>
+              </a:rPr>
+              <a:t>Logistic Regression</a:t>
+            </a:r>
+            <a:endParaRPr b="1" i="0" sz="2700" u="none" cap="none" strike="noStrike">
+              <a:solidFill>
+                <a:srgbClr val="757070"/>
               </a:solidFill>
               <a:latin typeface="Arial"/>
               <a:ea typeface="Arial"/>
@@ -20922,8 +20828,8 @@
         </p:nvSpPr>
         <p:spPr>
           <a:xfrm>
-            <a:off x="789544" y="1170535"/>
-            <a:ext cx="7592456" cy="507831"/>
+            <a:off x="2967471" y="1678363"/>
+            <a:ext cx="2970600" cy="400200"/>
           </a:xfrm>
           <a:prstGeom prst="rect">
             <a:avLst/>
@@ -20939,38 +20845,38 @@
           </a:bodyPr>
           <a:lstStyle/>
           <a:p>
-            <a:pPr indent="0" lvl="0" marL="0" marR="0" rtl="0" algn="l">
-              <a:lnSpc>
-                <a:spcPct val="100000"/>
-              </a:lnSpc>
-              <a:spcBef>
-                <a:spcPts val="0"/>
-              </a:spcBef>
-              <a:spcAft>
-                <a:spcPts val="0"/>
-              </a:spcAft>
-              <a:buClr>
-                <a:srgbClr val="000000"/>
-              </a:buClr>
-              <a:buSzPts val="2700"/>
+            <a:pPr indent="0" lvl="0" marL="0" marR="0" rtl="0" algn="ctr">
+              <a:lnSpc>
+                <a:spcPct val="100000"/>
+              </a:lnSpc>
+              <a:spcBef>
+                <a:spcPts val="0"/>
+              </a:spcBef>
+              <a:spcAft>
+                <a:spcPts val="0"/>
+              </a:spcAft>
+              <a:buClr>
+                <a:srgbClr val="000000"/>
+              </a:buClr>
+              <a:buSzPts val="2000"/>
               <a:buFont typeface="Arial"/>
               <a:buNone/>
             </a:pPr>
             <a:r>
-              <a:rPr b="1" i="0" lang="en-US" sz="2700" u="none" cap="none" strike="noStrike">
-                <a:solidFill>
-                  <a:srgbClr val="0D5486"/>
+              <a:rPr b="1" i="0" lang="en-US" sz="2000" u="none" cap="none" strike="noStrike">
+                <a:solidFill>
+                  <a:srgbClr val="757070"/>
                 </a:solidFill>
                 <a:latin typeface="Arial"/>
                 <a:ea typeface="Arial"/>
                 <a:cs typeface="Arial"/>
                 <a:sym typeface="Arial"/>
               </a:rPr>
-              <a:t>Comparación de Métricas</a:t>
+              <a:t>Random Forest</a:t>
             </a:r>
             <a:endParaRPr b="1" i="0" sz="2700" u="none" cap="none" strike="noStrike">
               <a:solidFill>
-                <a:srgbClr val="0D5486"/>
+                <a:srgbClr val="757070"/>
               </a:solidFill>
               <a:latin typeface="Arial"/>
               <a:ea typeface="Arial"/>
@@ -20988,8 +20894,8 @@
         </p:nvSpPr>
         <p:spPr>
           <a:xfrm>
-            <a:off x="285325" y="1678375"/>
-            <a:ext cx="2696100" cy="400200"/>
+            <a:off x="6622401" y="1678363"/>
+            <a:ext cx="1894800" cy="400200"/>
           </a:xfrm>
           <a:prstGeom prst="rect">
             <a:avLst/>
@@ -21032,7 +20938,31 @@
                 <a:cs typeface="Arial"/>
                 <a:sym typeface="Arial"/>
               </a:rPr>
-              <a:t>Logistic Regression</a:t>
+              <a:t>Light</a:t>
+            </a:r>
+            <a:r>
+              <a:rPr b="0" i="0" lang="en-US" sz="1400" u="none" cap="none" strike="noStrike">
+                <a:solidFill>
+                  <a:srgbClr val="000000"/>
+                </a:solidFill>
+                <a:latin typeface="Arial"/>
+                <a:ea typeface="Arial"/>
+                <a:cs typeface="Arial"/>
+                <a:sym typeface="Arial"/>
+              </a:rPr>
+              <a:t> </a:t>
+            </a:r>
+            <a:r>
+              <a:rPr b="1" i="0" lang="en-US" sz="2000" u="none" cap="none" strike="noStrike">
+                <a:solidFill>
+                  <a:srgbClr val="757070"/>
+                </a:solidFill>
+                <a:latin typeface="Arial"/>
+                <a:ea typeface="Arial"/>
+                <a:cs typeface="Arial"/>
+                <a:sym typeface="Arial"/>
+              </a:rPr>
+              <a:t>GBM</a:t>
             </a:r>
             <a:endParaRPr b="1" i="0" sz="2700" u="none" cap="none" strike="noStrike">
               <a:solidFill>
@@ -21054,8 +20984,8 @@
         </p:nvSpPr>
         <p:spPr>
           <a:xfrm>
-            <a:off x="2967471" y="1678363"/>
-            <a:ext cx="2970600" cy="400200"/>
+            <a:off x="9605889" y="1678369"/>
+            <a:ext cx="1668000" cy="400200"/>
           </a:xfrm>
           <a:prstGeom prst="rect">
             <a:avLst/>
@@ -21098,7 +21028,7 @@
                 <a:cs typeface="Arial"/>
                 <a:sym typeface="Arial"/>
               </a:rPr>
-              <a:t>Random Forest</a:t>
+              <a:t>XGBOOST </a:t>
             </a:r>
             <a:endParaRPr b="1" i="0" sz="2700" u="none" cap="none" strike="noStrike">
               <a:solidFill>
@@ -21120,162 +21050,6 @@
         </p:nvSpPr>
         <p:spPr>
           <a:xfrm>
-            <a:off x="6622401" y="1678363"/>
-            <a:ext cx="1894800" cy="400200"/>
-          </a:xfrm>
-          <a:prstGeom prst="rect">
-            <a:avLst/>
-          </a:prstGeom>
-          <a:noFill/>
-          <a:ln>
-            <a:noFill/>
-          </a:ln>
-        </p:spPr>
-        <p:txBody>
-          <a:bodyPr anchorCtr="0" anchor="t" bIns="45700" lIns="108000" spcFirstLastPara="1" rIns="108000" wrap="square" tIns="45700">
-            <a:spAutoFit/>
-          </a:bodyPr>
-          <a:lstStyle/>
-          <a:p>
-            <a:pPr indent="0" lvl="0" marL="0" marR="0" rtl="0" algn="ctr">
-              <a:lnSpc>
-                <a:spcPct val="100000"/>
-              </a:lnSpc>
-              <a:spcBef>
-                <a:spcPts val="0"/>
-              </a:spcBef>
-              <a:spcAft>
-                <a:spcPts val="0"/>
-              </a:spcAft>
-              <a:buClr>
-                <a:srgbClr val="000000"/>
-              </a:buClr>
-              <a:buSzPts val="2000"/>
-              <a:buFont typeface="Arial"/>
-              <a:buNone/>
-            </a:pPr>
-            <a:r>
-              <a:rPr b="1" i="0" lang="en-US" sz="2000" u="none" cap="none" strike="noStrike">
-                <a:solidFill>
-                  <a:srgbClr val="757070"/>
-                </a:solidFill>
-                <a:latin typeface="Arial"/>
-                <a:ea typeface="Arial"/>
-                <a:cs typeface="Arial"/>
-                <a:sym typeface="Arial"/>
-              </a:rPr>
-              <a:t>Light</a:t>
-            </a:r>
-            <a:r>
-              <a:rPr b="0" i="0" lang="en-US" sz="1400" u="none" cap="none" strike="noStrike">
-                <a:solidFill>
-                  <a:srgbClr val="000000"/>
-                </a:solidFill>
-                <a:latin typeface="Arial"/>
-                <a:ea typeface="Arial"/>
-                <a:cs typeface="Arial"/>
-                <a:sym typeface="Arial"/>
-              </a:rPr>
-              <a:t> </a:t>
-            </a:r>
-            <a:r>
-              <a:rPr b="1" i="0" lang="en-US" sz="2000" u="none" cap="none" strike="noStrike">
-                <a:solidFill>
-                  <a:srgbClr val="757070"/>
-                </a:solidFill>
-                <a:latin typeface="Arial"/>
-                <a:ea typeface="Arial"/>
-                <a:cs typeface="Arial"/>
-                <a:sym typeface="Arial"/>
-              </a:rPr>
-              <a:t>GBM</a:t>
-            </a:r>
-            <a:endParaRPr b="1" i="0" sz="2700" u="none" cap="none" strike="noStrike">
-              <a:solidFill>
-                <a:srgbClr val="757070"/>
-              </a:solidFill>
-              <a:latin typeface="Arial"/>
-              <a:ea typeface="Arial"/>
-              <a:cs typeface="Arial"/>
-              <a:sym typeface="Arial"/>
-            </a:endParaRPr>
-          </a:p>
-        </p:txBody>
-      </p:sp>
-      <p:sp>
-        <p:nvSpPr>
-          <p:cNvPr id="346" name="Google Shape;346;p26"/>
-          <p:cNvSpPr txBox="1"/>
-          <p:nvPr/>
-        </p:nvSpPr>
-        <p:spPr>
-          <a:xfrm>
-            <a:off x="9605889" y="1678369"/>
-            <a:ext cx="1668000" cy="400200"/>
-          </a:xfrm>
-          <a:prstGeom prst="rect">
-            <a:avLst/>
-          </a:prstGeom>
-          <a:noFill/>
-          <a:ln>
-            <a:noFill/>
-          </a:ln>
-        </p:spPr>
-        <p:txBody>
-          <a:bodyPr anchorCtr="0" anchor="t" bIns="45700" lIns="108000" spcFirstLastPara="1" rIns="108000" wrap="square" tIns="45700">
-            <a:spAutoFit/>
-          </a:bodyPr>
-          <a:lstStyle/>
-          <a:p>
-            <a:pPr indent="0" lvl="0" marL="0" marR="0" rtl="0" algn="ctr">
-              <a:lnSpc>
-                <a:spcPct val="100000"/>
-              </a:lnSpc>
-              <a:spcBef>
-                <a:spcPts val="0"/>
-              </a:spcBef>
-              <a:spcAft>
-                <a:spcPts val="0"/>
-              </a:spcAft>
-              <a:buClr>
-                <a:srgbClr val="000000"/>
-              </a:buClr>
-              <a:buSzPts val="2000"/>
-              <a:buFont typeface="Arial"/>
-              <a:buNone/>
-            </a:pPr>
-            <a:r>
-              <a:rPr b="1" i="0" lang="en-US" sz="2000" u="none" cap="none" strike="noStrike">
-                <a:solidFill>
-                  <a:srgbClr val="757070"/>
-                </a:solidFill>
-                <a:latin typeface="Arial"/>
-                <a:ea typeface="Arial"/>
-                <a:cs typeface="Arial"/>
-                <a:sym typeface="Arial"/>
-              </a:rPr>
-              <a:t>XGBOOST </a:t>
-            </a:r>
-            <a:endParaRPr b="1" i="0" sz="2700" u="none" cap="none" strike="noStrike">
-              <a:solidFill>
-                <a:srgbClr val="757070"/>
-              </a:solidFill>
-              <a:latin typeface="Arial"/>
-              <a:ea typeface="Arial"/>
-              <a:cs typeface="Arial"/>
-              <a:sym typeface="Arial"/>
-            </a:endParaRPr>
-          </a:p>
-        </p:txBody>
-      </p:sp>
-      <p:sp>
-        <p:nvSpPr>
-          <p:cNvPr id="347" name="Google Shape;347;p26"/>
-          <p:cNvSpPr txBox="1"/>
-          <p:nvPr/>
-        </p:nvSpPr>
-        <p:spPr>
-          <a:xfrm>
             <a:off x="125413" y="4965175"/>
             <a:ext cx="3015900" cy="1154400"/>
           </a:xfrm>
@@ -21572,7 +21346,7 @@
       </p:sp>
       <p:sp>
         <p:nvSpPr>
-          <p:cNvPr id="348" name="Google Shape;348;p26"/>
+          <p:cNvPr id="346" name="Google Shape;346;p26"/>
           <p:cNvSpPr txBox="1"/>
           <p:nvPr/>
         </p:nvSpPr>
@@ -21874,7 +21648,7 @@
       </p:sp>
       <p:sp>
         <p:nvSpPr>
-          <p:cNvPr id="349" name="Google Shape;349;p26"/>
+          <p:cNvPr id="347" name="Google Shape;347;p26"/>
           <p:cNvSpPr txBox="1"/>
           <p:nvPr/>
         </p:nvSpPr>
@@ -22173,7 +21947,7 @@
       </p:sp>
       <p:sp>
         <p:nvSpPr>
-          <p:cNvPr id="350" name="Google Shape;350;p26"/>
+          <p:cNvPr id="348" name="Google Shape;348;p26"/>
           <p:cNvSpPr txBox="1"/>
           <p:nvPr/>
         </p:nvSpPr>
@@ -22475,7 +22249,7 @@
       </p:sp>
       <p:pic>
         <p:nvPicPr>
-          <p:cNvPr id="351" name="Google Shape;351;p26"/>
+          <p:cNvPr id="349" name="Google Shape;349;p26"/>
           <p:cNvPicPr preferRelativeResize="0"/>
           <p:nvPr/>
         </p:nvPicPr>
@@ -22503,7 +22277,7 @@
       </p:pic>
       <p:pic>
         <p:nvPicPr>
-          <p:cNvPr id="352" name="Google Shape;352;p26"/>
+          <p:cNvPr id="350" name="Google Shape;350;p26"/>
           <p:cNvPicPr preferRelativeResize="0"/>
           <p:nvPr/>
         </p:nvPicPr>
@@ -22531,7 +22305,7 @@
       </p:pic>
       <p:pic>
         <p:nvPicPr>
-          <p:cNvPr id="353" name="Google Shape;353;p26"/>
+          <p:cNvPr id="351" name="Google Shape;351;p26"/>
           <p:cNvPicPr preferRelativeResize="0"/>
           <p:nvPr/>
         </p:nvPicPr>
@@ -22559,7 +22333,7 @@
       </p:pic>
       <p:pic>
         <p:nvPicPr>
-          <p:cNvPr id="354" name="Google Shape;354;p26"/>
+          <p:cNvPr id="352" name="Google Shape;352;p26"/>
           <p:cNvPicPr preferRelativeResize="0"/>
           <p:nvPr/>
         </p:nvPicPr>
@@ -22598,7 +22372,7 @@
   <p:cSld>
     <p:spTree>
       <p:nvGrpSpPr>
-        <p:cNvPr id="359" name="Shape 359"/>
+        <p:cNvPr id="357" name="Shape 357"/>
         <p:cNvGrpSpPr/>
         <p:nvPr/>
       </p:nvGrpSpPr>
@@ -22612,7 +22386,7 @@
       </p:grpSpPr>
       <p:sp>
         <p:nvSpPr>
-          <p:cNvPr id="360" name="Google Shape;360;p27"/>
+          <p:cNvPr id="358" name="Google Shape;358;p27"/>
           <p:cNvSpPr txBox="1"/>
           <p:nvPr>
             <p:ph idx="12" type="sldNum"/>
@@ -22664,7 +22438,7 @@
       </p:sp>
       <p:sp>
         <p:nvSpPr>
-          <p:cNvPr id="361" name="Google Shape;361;p27"/>
+          <p:cNvPr id="359" name="Google Shape;359;p27"/>
           <p:cNvSpPr txBox="1"/>
           <p:nvPr/>
         </p:nvSpPr>
@@ -22730,7 +22504,7 @@
       </p:sp>
       <p:sp>
         <p:nvSpPr>
-          <p:cNvPr id="362" name="Google Shape;362;p27"/>
+          <p:cNvPr id="360" name="Google Shape;360;p27"/>
           <p:cNvSpPr txBox="1"/>
           <p:nvPr/>
         </p:nvSpPr>
@@ -22796,7 +22570,7 @@
       </p:sp>
       <p:sp>
         <p:nvSpPr>
-          <p:cNvPr id="363" name="Google Shape;363;p27"/>
+          <p:cNvPr id="361" name="Google Shape;361;p27"/>
           <p:cNvSpPr txBox="1"/>
           <p:nvPr/>
         </p:nvSpPr>
@@ -23019,7 +22793,7 @@
       </p:sp>
       <p:sp>
         <p:nvSpPr>
-          <p:cNvPr id="364" name="Google Shape;364;p27"/>
+          <p:cNvPr id="362" name="Google Shape;362;p27"/>
           <p:cNvSpPr txBox="1"/>
           <p:nvPr/>
         </p:nvSpPr>
@@ -23195,7 +22969,7 @@
       </p:sp>
       <p:pic>
         <p:nvPicPr>
-          <p:cNvPr id="365" name="Google Shape;365;p27"/>
+          <p:cNvPr id="363" name="Google Shape;363;p27"/>
           <p:cNvPicPr preferRelativeResize="0"/>
           <p:nvPr/>
         </p:nvPicPr>
@@ -23222,7 +22996,7 @@
       </p:pic>
       <p:pic>
         <p:nvPicPr>
-          <p:cNvPr id="366" name="Google Shape;366;p27"/>
+          <p:cNvPr id="364" name="Google Shape;364;p27"/>
           <p:cNvPicPr preferRelativeResize="0"/>
           <p:nvPr/>
         </p:nvPicPr>
@@ -23260,7 +23034,7 @@
   <p:cSld>
     <p:spTree>
       <p:nvGrpSpPr>
-        <p:cNvPr id="371" name="Shape 371"/>
+        <p:cNvPr id="369" name="Shape 369"/>
         <p:cNvGrpSpPr/>
         <p:nvPr/>
       </p:nvGrpSpPr>
@@ -23274,7 +23048,7 @@
       </p:grpSpPr>
       <p:sp>
         <p:nvSpPr>
-          <p:cNvPr id="372" name="Google Shape;372;p28"/>
+          <p:cNvPr id="370" name="Google Shape;370;p28"/>
           <p:cNvSpPr txBox="1"/>
           <p:nvPr>
             <p:ph idx="12" type="sldNum"/>
@@ -23326,7 +23100,7 @@
       </p:sp>
       <p:sp>
         <p:nvSpPr>
-          <p:cNvPr id="373" name="Google Shape;373;p28"/>
+          <p:cNvPr id="371" name="Google Shape;371;p28"/>
           <p:cNvSpPr txBox="1"/>
           <p:nvPr/>
         </p:nvSpPr>
@@ -23392,7 +23166,7 @@
       </p:sp>
       <p:sp>
         <p:nvSpPr>
-          <p:cNvPr id="374" name="Google Shape;374;p28"/>
+          <p:cNvPr id="372" name="Google Shape;372;p28"/>
           <p:cNvSpPr txBox="1"/>
           <p:nvPr/>
         </p:nvSpPr>
@@ -23458,7 +23232,7 @@
       </p:sp>
       <p:sp>
         <p:nvSpPr>
-          <p:cNvPr id="375" name="Google Shape;375;p28"/>
+          <p:cNvPr id="373" name="Google Shape;373;p28"/>
           <p:cNvSpPr txBox="1"/>
           <p:nvPr/>
         </p:nvSpPr>
@@ -23564,7 +23338,7 @@
       </p:sp>
       <p:pic>
         <p:nvPicPr>
-          <p:cNvPr id="376" name="Google Shape;376;p28"/>
+          <p:cNvPr id="374" name="Google Shape;374;p28"/>
           <p:cNvPicPr preferRelativeResize="0"/>
           <p:nvPr/>
         </p:nvPicPr>
@@ -23591,7 +23365,7 @@
       </p:pic>
       <p:pic>
         <p:nvPicPr>
-          <p:cNvPr id="377" name="Google Shape;377;p28"/>
+          <p:cNvPr id="375" name="Google Shape;375;p28"/>
           <p:cNvPicPr preferRelativeResize="0"/>
           <p:nvPr/>
         </p:nvPicPr>
@@ -23629,7 +23403,7 @@
   <p:cSld>
     <p:spTree>
       <p:nvGrpSpPr>
-        <p:cNvPr id="382" name="Shape 382"/>
+        <p:cNvPr id="380" name="Shape 380"/>
         <p:cNvGrpSpPr/>
         <p:nvPr/>
       </p:nvGrpSpPr>
@@ -23643,7 +23417,7 @@
       </p:grpSpPr>
       <p:sp>
         <p:nvSpPr>
-          <p:cNvPr id="383" name="Google Shape;383;p29"/>
+          <p:cNvPr id="381" name="Google Shape;381;p29"/>
           <p:cNvSpPr txBox="1"/>
           <p:nvPr>
             <p:ph idx="12" type="sldNum"/>
@@ -23695,7 +23469,7 @@
       </p:sp>
       <p:sp>
         <p:nvSpPr>
-          <p:cNvPr id="384" name="Google Shape;384;p29"/>
+          <p:cNvPr id="382" name="Google Shape;382;p29"/>
           <p:cNvSpPr txBox="1"/>
           <p:nvPr/>
         </p:nvSpPr>
@@ -23761,7 +23535,7 @@
       </p:sp>
       <p:sp>
         <p:nvSpPr>
-          <p:cNvPr id="385" name="Google Shape;385;p29"/>
+          <p:cNvPr id="383" name="Google Shape;383;p29"/>
           <p:cNvSpPr txBox="1"/>
           <p:nvPr/>
         </p:nvSpPr>
@@ -23854,6 +23628,237 @@
               <a:t>egocio</a:t>
             </a:r>
             <a:endParaRPr b="1" i="0" sz="2700" u="none" cap="none" strike="noStrike">
+              <a:solidFill>
+                <a:srgbClr val="0D5486"/>
+              </a:solidFill>
+              <a:latin typeface="Arial"/>
+              <a:ea typeface="Arial"/>
+              <a:cs typeface="Arial"/>
+              <a:sym typeface="Arial"/>
+            </a:endParaRPr>
+          </a:p>
+        </p:txBody>
+      </p:sp>
+      <p:sp>
+        <p:nvSpPr>
+          <p:cNvPr id="384" name="Google Shape;384;p29"/>
+          <p:cNvSpPr txBox="1"/>
+          <p:nvPr/>
+        </p:nvSpPr>
+        <p:spPr>
+          <a:xfrm>
+            <a:off x="913150" y="2333775"/>
+            <a:ext cx="9647700" cy="785100"/>
+          </a:xfrm>
+          <a:prstGeom prst="rect">
+            <a:avLst/>
+          </a:prstGeom>
+          <a:noFill/>
+          <a:ln>
+            <a:noFill/>
+          </a:ln>
+        </p:spPr>
+        <p:txBody>
+          <a:bodyPr anchorCtr="0" anchor="t" bIns="45700" lIns="91425" spcFirstLastPara="1" rIns="91425" wrap="square" tIns="45700">
+            <a:spAutoFit/>
+          </a:bodyPr>
+          <a:lstStyle/>
+          <a:p>
+            <a:pPr indent="-323850" lvl="0" marL="342900" marR="0" rtl="0" algn="l">
+              <a:lnSpc>
+                <a:spcPct val="100000"/>
+              </a:lnSpc>
+              <a:spcBef>
+                <a:spcPts val="0"/>
+              </a:spcBef>
+              <a:spcAft>
+                <a:spcPts val="0"/>
+              </a:spcAft>
+              <a:buClr>
+                <a:srgbClr val="757070"/>
+              </a:buClr>
+              <a:buSzPts val="1500"/>
+              <a:buFont typeface="Arial"/>
+              <a:buChar char="●"/>
+            </a:pPr>
+            <a:r>
+              <a:rPr lang="en-US" sz="1500">
+                <a:solidFill>
+                  <a:srgbClr val="757070"/>
+                </a:solidFill>
+              </a:rPr>
+              <a:t>Buscar el m</a:t>
+            </a:r>
+            <a:r>
+              <a:rPr b="0" i="0" lang="en-US" sz="1500" u="none" cap="none" strike="noStrike">
+                <a:solidFill>
+                  <a:srgbClr val="757070"/>
+                </a:solidFill>
+                <a:latin typeface="Arial"/>
+                <a:ea typeface="Arial"/>
+                <a:cs typeface="Arial"/>
+                <a:sym typeface="Arial"/>
+              </a:rPr>
+              <a:t>odelo con mayor recall para la clase positiva.</a:t>
+            </a:r>
+            <a:endParaRPr b="0" i="0" sz="1500" u="none" cap="none" strike="noStrike">
+              <a:solidFill>
+                <a:srgbClr val="757070"/>
+              </a:solidFill>
+              <a:latin typeface="Arial"/>
+              <a:ea typeface="Arial"/>
+              <a:cs typeface="Arial"/>
+              <a:sym typeface="Arial"/>
+            </a:endParaRPr>
+          </a:p>
+          <a:p>
+            <a:pPr indent="-323850" lvl="0" marL="342900" marR="0" rtl="0" algn="l">
+              <a:lnSpc>
+                <a:spcPct val="100000"/>
+              </a:lnSpc>
+              <a:spcBef>
+                <a:spcPts val="0"/>
+              </a:spcBef>
+              <a:spcAft>
+                <a:spcPts val="0"/>
+              </a:spcAft>
+              <a:buClr>
+                <a:srgbClr val="757070"/>
+              </a:buClr>
+              <a:buSzPts val="1500"/>
+              <a:buFont typeface="Arial"/>
+              <a:buChar char="●"/>
+            </a:pPr>
+            <a:r>
+              <a:rPr b="0" i="0" lang="en-US" sz="1500" u="none" cap="none" strike="noStrike">
+                <a:solidFill>
+                  <a:srgbClr val="757070"/>
+                </a:solidFill>
+                <a:latin typeface="Arial"/>
+                <a:ea typeface="Arial"/>
+                <a:cs typeface="Arial"/>
+                <a:sym typeface="Arial"/>
+              </a:rPr>
+              <a:t>Mejorar la calidad en los datos, no juntar datos irrelevantes para el </a:t>
+            </a:r>
+            <a:r>
+              <a:rPr lang="en-US" sz="1500">
+                <a:solidFill>
+                  <a:srgbClr val="757070"/>
+                </a:solidFill>
+              </a:rPr>
+              <a:t>análisis de datos</a:t>
+            </a:r>
+            <a:r>
+              <a:rPr b="0" i="0" lang="en-US" sz="1500" u="none" cap="none" strike="noStrike">
+                <a:solidFill>
+                  <a:srgbClr val="757070"/>
+                </a:solidFill>
+                <a:latin typeface="Arial"/>
+                <a:ea typeface="Arial"/>
+                <a:cs typeface="Arial"/>
+                <a:sym typeface="Arial"/>
+              </a:rPr>
+              <a:t>.</a:t>
+            </a:r>
+            <a:endParaRPr b="0" i="0" sz="1500" u="none" cap="none" strike="noStrike">
+              <a:solidFill>
+                <a:srgbClr val="757070"/>
+              </a:solidFill>
+              <a:latin typeface="Arial"/>
+              <a:ea typeface="Arial"/>
+              <a:cs typeface="Arial"/>
+              <a:sym typeface="Arial"/>
+            </a:endParaRPr>
+          </a:p>
+          <a:p>
+            <a:pPr indent="-323850" lvl="0" marL="342900" marR="0" rtl="0" algn="l">
+              <a:lnSpc>
+                <a:spcPct val="100000"/>
+              </a:lnSpc>
+              <a:spcBef>
+                <a:spcPts val="0"/>
+              </a:spcBef>
+              <a:spcAft>
+                <a:spcPts val="0"/>
+              </a:spcAft>
+              <a:buClr>
+                <a:srgbClr val="757070"/>
+              </a:buClr>
+              <a:buSzPts val="1500"/>
+              <a:buChar char="●"/>
+            </a:pPr>
+            <a:r>
+              <a:rPr lang="en-US" sz="1500">
+                <a:solidFill>
+                  <a:srgbClr val="757070"/>
+                </a:solidFill>
+              </a:rPr>
+              <a:t>Tratamiento del balance de clases: submuestreo de clase mayoritaria. </a:t>
+            </a:r>
+            <a:endParaRPr sz="1500">
+              <a:solidFill>
+                <a:srgbClr val="757070"/>
+              </a:solidFill>
+            </a:endParaRPr>
+          </a:p>
+        </p:txBody>
+      </p:sp>
+      <p:sp>
+        <p:nvSpPr>
+          <p:cNvPr id="385" name="Google Shape;385;p29"/>
+          <p:cNvSpPr txBox="1"/>
+          <p:nvPr/>
+        </p:nvSpPr>
+        <p:spPr>
+          <a:xfrm>
+            <a:off x="707656" y="1871309"/>
+            <a:ext cx="7592456" cy="400110"/>
+          </a:xfrm>
+          <a:prstGeom prst="rect">
+            <a:avLst/>
+          </a:prstGeom>
+          <a:noFill/>
+          <a:ln>
+            <a:noFill/>
+          </a:ln>
+        </p:spPr>
+        <p:txBody>
+          <a:bodyPr anchorCtr="0" anchor="t" bIns="45700" lIns="108000" spcFirstLastPara="1" rIns="108000" wrap="square" tIns="45700">
+            <a:spAutoFit/>
+          </a:bodyPr>
+          <a:lstStyle/>
+          <a:p>
+            <a:pPr indent="0" lvl="0" marL="0" marR="0" rtl="0" algn="l">
+              <a:lnSpc>
+                <a:spcPct val="100000"/>
+              </a:lnSpc>
+              <a:spcBef>
+                <a:spcPts val="0"/>
+              </a:spcBef>
+              <a:spcAft>
+                <a:spcPts val="0"/>
+              </a:spcAft>
+              <a:buClr>
+                <a:srgbClr val="000000"/>
+              </a:buClr>
+              <a:buSzPts val="2000"/>
+              <a:buFont typeface="Arial"/>
+              <a:buNone/>
+            </a:pPr>
+            <a:r>
+              <a:rPr b="1" i="0" lang="en-US" sz="2000" u="none" cap="none" strike="noStrike">
+                <a:solidFill>
+                  <a:srgbClr val="0D5486"/>
+                </a:solidFill>
+                <a:latin typeface="Arial"/>
+                <a:ea typeface="Arial"/>
+                <a:cs typeface="Arial"/>
+                <a:sym typeface="Arial"/>
+              </a:rPr>
+              <a:t>Creación y selección del modelo:</a:t>
+            </a:r>
+            <a:endParaRPr b="1" i="0" sz="2000" u="none" cap="none" strike="noStrike">
               <a:solidFill>
                 <a:srgbClr val="0D5486"/>
               </a:solidFill>
@@ -23873,173 +23878,8 @@
         </p:nvSpPr>
         <p:spPr>
           <a:xfrm>
-            <a:off x="913150" y="2333775"/>
-            <a:ext cx="9647700" cy="785100"/>
-          </a:xfrm>
-          <a:prstGeom prst="rect">
-            <a:avLst/>
-          </a:prstGeom>
-          <a:noFill/>
-          <a:ln>
-            <a:noFill/>
-          </a:ln>
-        </p:spPr>
-        <p:txBody>
-          <a:bodyPr anchorCtr="0" anchor="t" bIns="45700" lIns="91425" spcFirstLastPara="1" rIns="91425" wrap="square" tIns="45700">
-            <a:spAutoFit/>
-          </a:bodyPr>
-          <a:lstStyle/>
-          <a:p>
-            <a:pPr indent="-323850" lvl="0" marL="342900" marR="0" rtl="0" algn="l">
-              <a:lnSpc>
-                <a:spcPct val="100000"/>
-              </a:lnSpc>
-              <a:spcBef>
-                <a:spcPts val="0"/>
-              </a:spcBef>
-              <a:spcAft>
-                <a:spcPts val="0"/>
-              </a:spcAft>
-              <a:buClr>
-                <a:srgbClr val="757070"/>
-              </a:buClr>
-              <a:buSzPts val="1500"/>
-              <a:buFont typeface="Arial"/>
-              <a:buChar char="●"/>
-            </a:pPr>
-            <a:r>
-              <a:rPr lang="en-US" sz="1500">
-                <a:solidFill>
-                  <a:srgbClr val="757070"/>
-                </a:solidFill>
-              </a:rPr>
-              <a:t>Buscar el m</a:t>
-            </a:r>
-            <a:r>
-              <a:rPr b="0" i="0" lang="en-US" sz="1500" u="none" cap="none" strike="noStrike">
-                <a:solidFill>
-                  <a:srgbClr val="757070"/>
-                </a:solidFill>
-                <a:latin typeface="Arial"/>
-                <a:ea typeface="Arial"/>
-                <a:cs typeface="Arial"/>
-                <a:sym typeface="Arial"/>
-              </a:rPr>
-              <a:t>odelo con mayor recall para la clase positiva.</a:t>
-            </a:r>
-            <a:endParaRPr b="0" i="0" sz="1500" u="none" cap="none" strike="noStrike">
-              <a:solidFill>
-                <a:srgbClr val="757070"/>
-              </a:solidFill>
-              <a:latin typeface="Arial"/>
-              <a:ea typeface="Arial"/>
-              <a:cs typeface="Arial"/>
-              <a:sym typeface="Arial"/>
-            </a:endParaRPr>
-          </a:p>
-          <a:p>
-            <a:pPr indent="-323850" lvl="0" marL="342900" marR="0" rtl="0" algn="l">
-              <a:lnSpc>
-                <a:spcPct val="100000"/>
-              </a:lnSpc>
-              <a:spcBef>
-                <a:spcPts val="0"/>
-              </a:spcBef>
-              <a:spcAft>
-                <a:spcPts val="0"/>
-              </a:spcAft>
-              <a:buClr>
-                <a:srgbClr val="757070"/>
-              </a:buClr>
-              <a:buSzPts val="1500"/>
-              <a:buFont typeface="Arial"/>
-              <a:buChar char="●"/>
-            </a:pPr>
-            <a:r>
-              <a:rPr b="0" i="0" lang="en-US" sz="1500" u="none" cap="none" strike="noStrike">
-                <a:solidFill>
-                  <a:srgbClr val="757070"/>
-                </a:solidFill>
-                <a:latin typeface="Arial"/>
-                <a:ea typeface="Arial"/>
-                <a:cs typeface="Arial"/>
-                <a:sym typeface="Arial"/>
-              </a:rPr>
-              <a:t>Mejorar la calidad en los datos, no juntar datos irrelevantes para el </a:t>
-            </a:r>
-            <a:r>
-              <a:rPr lang="en-US" sz="1500">
-                <a:solidFill>
-                  <a:srgbClr val="757070"/>
-                </a:solidFill>
-              </a:rPr>
-              <a:t>análisis de datos</a:t>
-            </a:r>
-            <a:r>
-              <a:rPr b="0" i="0" lang="en-US" sz="1500" u="none" cap="none" strike="noStrike">
-                <a:solidFill>
-                  <a:srgbClr val="757070"/>
-                </a:solidFill>
-                <a:latin typeface="Arial"/>
-                <a:ea typeface="Arial"/>
-                <a:cs typeface="Arial"/>
-                <a:sym typeface="Arial"/>
-              </a:rPr>
-              <a:t>.</a:t>
-            </a:r>
-            <a:endParaRPr b="0" i="0" sz="1500" u="none" cap="none" strike="noStrike">
-              <a:solidFill>
-                <a:srgbClr val="757070"/>
-              </a:solidFill>
-              <a:latin typeface="Arial"/>
-              <a:ea typeface="Arial"/>
-              <a:cs typeface="Arial"/>
-              <a:sym typeface="Arial"/>
-            </a:endParaRPr>
-          </a:p>
-          <a:p>
-            <a:pPr indent="-323850" lvl="0" marL="342900" marR="0" rtl="0" algn="l">
-              <a:lnSpc>
-                <a:spcPct val="100000"/>
-              </a:lnSpc>
-              <a:spcBef>
-                <a:spcPts val="0"/>
-              </a:spcBef>
-              <a:spcAft>
-                <a:spcPts val="0"/>
-              </a:spcAft>
-              <a:buClr>
-                <a:srgbClr val="757070"/>
-              </a:buClr>
-              <a:buSzPts val="1500"/>
-              <a:buChar char="●"/>
-            </a:pPr>
-            <a:r>
-              <a:rPr lang="en-US" sz="1500">
-                <a:solidFill>
-                  <a:srgbClr val="757070"/>
-                </a:solidFill>
-              </a:rPr>
-              <a:t>Tratamiento del balance de clases: submuestreo de clase mayoritaria. </a:t>
-            </a:r>
-            <a:endParaRPr sz="1500">
-              <a:solidFill>
-                <a:srgbClr val="757070"/>
-              </a:solidFill>
-            </a:endParaRPr>
-          </a:p>
-        </p:txBody>
-      </p:sp>
-      <p:sp>
-        <p:nvSpPr>
-          <p:cNvPr id="387" name="Google Shape;387;p29"/>
-          <p:cNvSpPr txBox="1"/>
-          <p:nvPr/>
-        </p:nvSpPr>
-        <p:spPr>
-          <a:xfrm>
-            <a:off x="707656" y="1871309"/>
-            <a:ext cx="7592456" cy="400110"/>
+            <a:off x="747169" y="3046960"/>
+            <a:ext cx="7592400" cy="400200"/>
           </a:xfrm>
           <a:prstGeom prst="rect">
             <a:avLst/>
@@ -24082,7 +23922,7 @@
                 <a:cs typeface="Arial"/>
                 <a:sym typeface="Arial"/>
               </a:rPr>
-              <a:t>Creación y selección del modelo:</a:t>
+              <a:t>Acciones en cuanto a las formaciones:</a:t>
             </a:r>
             <a:endParaRPr b="1" i="0" sz="2000" u="none" cap="none" strike="noStrike">
               <a:solidFill>
@@ -24098,73 +23938,7 @@
       </p:sp>
       <p:sp>
         <p:nvSpPr>
-          <p:cNvPr id="388" name="Google Shape;388;p29"/>
-          <p:cNvSpPr txBox="1"/>
-          <p:nvPr/>
-        </p:nvSpPr>
-        <p:spPr>
-          <a:xfrm>
-            <a:off x="747169" y="3046960"/>
-            <a:ext cx="7592400" cy="400200"/>
-          </a:xfrm>
-          <a:prstGeom prst="rect">
-            <a:avLst/>
-          </a:prstGeom>
-          <a:noFill/>
-          <a:ln>
-            <a:noFill/>
-          </a:ln>
-        </p:spPr>
-        <p:txBody>
-          <a:bodyPr anchorCtr="0" anchor="t" bIns="45700" lIns="108000" spcFirstLastPara="1" rIns="108000" wrap="square" tIns="45700">
-            <a:spAutoFit/>
-          </a:bodyPr>
-          <a:lstStyle/>
-          <a:p>
-            <a:pPr indent="0" lvl="0" marL="0" marR="0" rtl="0" algn="l">
-              <a:lnSpc>
-                <a:spcPct val="100000"/>
-              </a:lnSpc>
-              <a:spcBef>
-                <a:spcPts val="0"/>
-              </a:spcBef>
-              <a:spcAft>
-                <a:spcPts val="0"/>
-              </a:spcAft>
-              <a:buClr>
-                <a:srgbClr val="000000"/>
-              </a:buClr>
-              <a:buSzPts val="2000"/>
-              <a:buFont typeface="Arial"/>
-              <a:buNone/>
-            </a:pPr>
-            <a:r>
-              <a:rPr b="1" i="0" lang="en-US" sz="2000" u="none" cap="none" strike="noStrike">
-                <a:solidFill>
-                  <a:srgbClr val="0D5486"/>
-                </a:solidFill>
-                <a:latin typeface="Arial"/>
-                <a:ea typeface="Arial"/>
-                <a:cs typeface="Arial"/>
-                <a:sym typeface="Arial"/>
-              </a:rPr>
-              <a:t>Acciones en cuanto a las formaciones:</a:t>
-            </a:r>
-            <a:endParaRPr b="1" i="0" sz="2000" u="none" cap="none" strike="noStrike">
-              <a:solidFill>
-                <a:srgbClr val="0D5486"/>
-              </a:solidFill>
-              <a:latin typeface="Arial"/>
-              <a:ea typeface="Arial"/>
-              <a:cs typeface="Arial"/>
-              <a:sym typeface="Arial"/>
-            </a:endParaRPr>
-          </a:p>
-        </p:txBody>
-      </p:sp>
-      <p:sp>
-        <p:nvSpPr>
-          <p:cNvPr id="389" name="Google Shape;389;p29"/>
+          <p:cNvPr id="387" name="Google Shape;387;p29"/>
           <p:cNvSpPr txBox="1"/>
           <p:nvPr/>
         </p:nvSpPr>
@@ -24441,7 +24215,7 @@
   <p:cSld>
     <p:spTree>
       <p:nvGrpSpPr>
-        <p:cNvPr id="393" name="Shape 393"/>
+        <p:cNvPr id="391" name="Shape 391"/>
         <p:cNvGrpSpPr/>
         <p:nvPr/>
       </p:nvGrpSpPr>
@@ -24455,7 +24229,7 @@
       </p:grpSpPr>
       <p:sp>
         <p:nvSpPr>
-          <p:cNvPr id="394" name="Google Shape;394;p30"/>
+          <p:cNvPr id="392" name="Google Shape;392;p30"/>
           <p:cNvSpPr txBox="1"/>
           <p:nvPr>
             <p:ph idx="12" type="sldNum"/>
@@ -24503,7 +24277,7 @@
       </p:sp>
       <p:sp>
         <p:nvSpPr>
-          <p:cNvPr id="395" name="Google Shape;395;p30"/>
+          <p:cNvPr id="393" name="Google Shape;393;p30"/>
           <p:cNvSpPr/>
           <p:nvPr/>
         </p:nvSpPr>
@@ -24562,7 +24336,7 @@
       </p:sp>
       <p:sp>
         <p:nvSpPr>
-          <p:cNvPr id="396" name="Google Shape;396;p30"/>
+          <p:cNvPr id="394" name="Google Shape;394;p30"/>
           <p:cNvSpPr/>
           <p:nvPr/>
         </p:nvSpPr>
@@ -24621,7 +24395,7 @@
       </p:sp>
       <p:sp>
         <p:nvSpPr>
-          <p:cNvPr id="397" name="Google Shape;397;p30"/>
+          <p:cNvPr id="395" name="Google Shape;395;p30"/>
           <p:cNvSpPr txBox="1"/>
           <p:nvPr/>
         </p:nvSpPr>
@@ -24727,7 +24501,7 @@
       </p:sp>
       <p:sp>
         <p:nvSpPr>
-          <p:cNvPr id="398" name="Google Shape;398;p30"/>
+          <p:cNvPr id="396" name="Google Shape;396;p30"/>
           <p:cNvSpPr/>
           <p:nvPr/>
         </p:nvSpPr>
@@ -26064,7 +25838,7 @@
             <a:tbl>
               <a:tblPr>
                 <a:noFill/>
-                <a:tableStyleId>{27B7509C-737F-4DEB-A2FE-EB2117962778}</a:tableStyleId>
+                <a:tableStyleId>{499A2A1C-289C-4BE8-96CC-102C3334B7F5}</a:tableStyleId>
               </a:tblPr>
               <a:tblGrid>
                 <a:gridCol w="2896400"/>
@@ -30453,6 +30227,285 @@
 </file>
 
 <file path=ppt/theme/theme1.xml><?xml version="1.0" encoding="utf-8"?>
+<a:theme xmlns:a="http://schemas.openxmlformats.org/drawingml/2006/main" xmlns:r="http://schemas.openxmlformats.org/officeDocument/2006/relationships" name="ITBA">
+  <a:themeElements>
+    <a:clrScheme name="Tema de Office">
+      <a:dk1>
+        <a:srgbClr val="000000"/>
+      </a:dk1>
+      <a:lt1>
+        <a:srgbClr val="FFFFFF"/>
+      </a:lt1>
+      <a:dk2>
+        <a:srgbClr val="44546A"/>
+      </a:dk2>
+      <a:lt2>
+        <a:srgbClr val="E7E6E6"/>
+      </a:lt2>
+      <a:accent1>
+        <a:srgbClr val="5B9BD5"/>
+      </a:accent1>
+      <a:accent2>
+        <a:srgbClr val="ED7D31"/>
+      </a:accent2>
+      <a:accent3>
+        <a:srgbClr val="A5A5A5"/>
+      </a:accent3>
+      <a:accent4>
+        <a:srgbClr val="FFC000"/>
+      </a:accent4>
+      <a:accent5>
+        <a:srgbClr val="4472C4"/>
+      </a:accent5>
+      <a:accent6>
+        <a:srgbClr val="70AD47"/>
+      </a:accent6>
+      <a:hlink>
+        <a:srgbClr val="0563C1"/>
+      </a:hlink>
+      <a:folHlink>
+        <a:srgbClr val="954F72"/>
+      </a:folHlink>
+    </a:clrScheme>
+    <a:fontScheme name="Office">
+      <a:majorFont>
+        <a:latin typeface="Arial"/>
+        <a:ea typeface=""/>
+        <a:cs typeface=""/>
+        <a:font script="Jpan" typeface="ＭＳ Ｐゴシック"/>
+        <a:font script="Hang" typeface="맑은 고딕"/>
+        <a:font script="Hans" typeface="宋体"/>
+        <a:font script="Hant" typeface="新細明體"/>
+        <a:font script="Arab" typeface="Times New Roman"/>
+        <a:font script="Hebr" typeface="Times New Roman"/>
+        <a:font script="Thai" typeface="Angsana New"/>
+        <a:font script="Ethi" typeface="Nyala"/>
+        <a:font script="Beng" typeface="Vrinda"/>
+        <a:font script="Gujr" typeface="Shruti"/>
+        <a:font script="Khmr" typeface="MoolBoran"/>
+        <a:font script="Knda" typeface="Tunga"/>
+        <a:font script="Guru" typeface="Raavi"/>
+        <a:font script="Cans" typeface="Euphemia"/>
+        <a:font script="Cher" typeface="Plantagenet Cherokee"/>
+        <a:font script="Yiii" typeface="Microsoft Yi Baiti"/>
+        <a:font script="Tibt" typeface="Microsoft Himalaya"/>
+        <a:font script="Thaa" typeface="MV Boli"/>
+        <a:font script="Deva" typeface="Mangal"/>
+        <a:font script="Telu" typeface="Gautami"/>
+        <a:font script="Taml" typeface="Latha"/>
+        <a:font script="Syrc" typeface="Estrangelo Edessa"/>
+        <a:font script="Orya" typeface="Kalinga"/>
+        <a:font script="Mlym" typeface="Kartika"/>
+        <a:font script="Laoo" typeface="DokChampa"/>
+        <a:font script="Sinh" typeface="Iskoola Pota"/>
+        <a:font script="Mong" typeface="Mongolian Baiti"/>
+        <a:font script="Viet" typeface="Times New Roman"/>
+        <a:font script="Uigh" typeface="Microsoft Uighur"/>
+        <a:font script="Geor" typeface="Sylfaen"/>
+      </a:majorFont>
+      <a:minorFont>
+        <a:latin typeface="Arial"/>
+        <a:ea typeface=""/>
+        <a:cs typeface=""/>
+        <a:font script="Jpan" typeface="ＭＳ Ｐゴシック"/>
+        <a:font script="Hang" typeface="맑은 고딕"/>
+        <a:font script="Hans" typeface="宋体"/>
+        <a:font script="Hant" typeface="新細明體"/>
+        <a:font script="Arab" typeface="Arial"/>
+        <a:font script="Hebr" typeface="Arial"/>
+        <a:font script="Thai" typeface="Cordia New"/>
+        <a:font script="Ethi" typeface="Nyala"/>
+        <a:font script="Beng" typeface="Vrinda"/>
+        <a:font script="Gujr" typeface="Shruti"/>
+        <a:font script="Khmr" typeface="DaunPenh"/>
+        <a:font script="Knda" typeface="Tunga"/>
+        <a:font script="Guru" typeface="Raavi"/>
+        <a:font script="Cans" typeface="Euphemia"/>
+        <a:font script="Cher" typeface="Plantagenet Cherokee"/>
+        <a:font script="Yiii" typeface="Microsoft Yi Baiti"/>
+        <a:font script="Tibt" typeface="Microsoft Himalaya"/>
+        <a:font script="Thaa" typeface="MV Boli"/>
+        <a:font script="Deva" typeface="Mangal"/>
+        <a:font script="Telu" typeface="Gautami"/>
+        <a:font script="Taml" typeface="Latha"/>
+        <a:font script="Syrc" typeface="Estrangelo Edessa"/>
+        <a:font script="Orya" typeface="Kalinga"/>
+        <a:font script="Mlym" typeface="Kartika"/>
+        <a:font script="Laoo" typeface="DokChampa"/>
+        <a:font script="Sinh" typeface="Iskoola Pota"/>
+        <a:font script="Mong" typeface="Mongolian Baiti"/>
+        <a:font script="Viet" typeface="Arial"/>
+        <a:font script="Uigh" typeface="Microsoft Uighur"/>
+        <a:font script="Geor" typeface="Sylfaen"/>
+      </a:minorFont>
+    </a:fontScheme>
+    <a:fmtScheme name="Office">
+      <a:fillStyleLst>
+        <a:solidFill>
+          <a:schemeClr val="phClr"/>
+        </a:solidFill>
+        <a:gradFill rotWithShape="1">
+          <a:gsLst>
+            <a:gs pos="0">
+              <a:schemeClr val="phClr">
+                <a:tint val="50000"/>
+                <a:satMod val="300000"/>
+              </a:schemeClr>
+            </a:gs>
+            <a:gs pos="35000">
+              <a:schemeClr val="phClr">
+                <a:tint val="37000"/>
+                <a:satMod val="300000"/>
+              </a:schemeClr>
+            </a:gs>
+            <a:gs pos="100000">
+              <a:schemeClr val="phClr">
+                <a:tint val="15000"/>
+                <a:satMod val="350000"/>
+              </a:schemeClr>
+            </a:gs>
+          </a:gsLst>
+          <a:lin ang="16200000" scaled="1"/>
+        </a:gradFill>
+        <a:gradFill rotWithShape="1">
+          <a:gsLst>
+            <a:gs pos="0">
+              <a:schemeClr val="phClr">
+                <a:tint val="100000"/>
+                <a:shade val="100000"/>
+                <a:satMod val="130000"/>
+              </a:schemeClr>
+            </a:gs>
+            <a:gs pos="100000">
+              <a:schemeClr val="phClr">
+                <a:tint val="50000"/>
+                <a:shade val="100000"/>
+                <a:satMod val="350000"/>
+              </a:schemeClr>
+            </a:gs>
+          </a:gsLst>
+          <a:lin ang="16200000" scaled="0"/>
+        </a:gradFill>
+      </a:fillStyleLst>
+      <a:lnStyleLst>
+        <a:ln w="9525" cap="flat" cmpd="sng" algn="ctr">
+          <a:solidFill>
+            <a:schemeClr val="phClr">
+              <a:shade val="95000"/>
+              <a:satMod val="105000"/>
+            </a:schemeClr>
+          </a:solidFill>
+          <a:prstDash val="solid"/>
+        </a:ln>
+        <a:ln w="25400" cap="flat" cmpd="sng" algn="ctr">
+          <a:solidFill>
+            <a:schemeClr val="phClr"/>
+          </a:solidFill>
+          <a:prstDash val="solid"/>
+        </a:ln>
+        <a:ln w="38100" cap="flat" cmpd="sng" algn="ctr">
+          <a:solidFill>
+            <a:schemeClr val="phClr"/>
+          </a:solidFill>
+          <a:prstDash val="solid"/>
+        </a:ln>
+      </a:lnStyleLst>
+      <a:effectStyleLst>
+        <a:effectStyle>
+          <a:effectLst>
+            <a:outerShdw blurRad="40000" dist="20000" dir="5400000" rotWithShape="0">
+              <a:srgbClr val="000000">
+                <a:alpha val="38000"/>
+              </a:srgbClr>
+            </a:outerShdw>
+          </a:effectLst>
+        </a:effectStyle>
+        <a:effectStyle>
+          <a:effectLst>
+            <a:outerShdw blurRad="40000" dist="23000" dir="5400000" rotWithShape="0">
+              <a:srgbClr val="000000">
+                <a:alpha val="35000"/>
+              </a:srgbClr>
+            </a:outerShdw>
+          </a:effectLst>
+        </a:effectStyle>
+        <a:effectStyle>
+          <a:effectLst>
+            <a:outerShdw blurRad="40000" dist="23000" dir="5400000" rotWithShape="0">
+              <a:srgbClr val="000000">
+                <a:alpha val="35000"/>
+              </a:srgbClr>
+            </a:outerShdw>
+          </a:effectLst>
+          <a:scene3d>
+            <a:camera prst="orthographicFront">
+              <a:rot lat="0" lon="0" rev="0"/>
+            </a:camera>
+            <a:lightRig rig="threePt" dir="t">
+              <a:rot lat="0" lon="0" rev="1200000"/>
+            </a:lightRig>
+          </a:scene3d>
+          <a:sp3d>
+            <a:bevelT w="63500" h="25400"/>
+          </a:sp3d>
+        </a:effectStyle>
+      </a:effectStyleLst>
+      <a:bgFillStyleLst>
+        <a:solidFill>
+          <a:schemeClr val="phClr"/>
+        </a:solidFill>
+        <a:gradFill rotWithShape="1">
+          <a:gsLst>
+            <a:gs pos="0">
+              <a:schemeClr val="phClr">
+                <a:tint val="40000"/>
+                <a:satMod val="350000"/>
+              </a:schemeClr>
+            </a:gs>
+            <a:gs pos="40000">
+              <a:schemeClr val="phClr">
+                <a:tint val="45000"/>
+                <a:shade val="99000"/>
+                <a:satMod val="350000"/>
+              </a:schemeClr>
+            </a:gs>
+            <a:gs pos="100000">
+              <a:schemeClr val="phClr">
+                <a:shade val="20000"/>
+                <a:satMod val="255000"/>
+              </a:schemeClr>
+            </a:gs>
+          </a:gsLst>
+          <a:path path="circle">
+            <a:fillToRect l="50000" t="-80000" r="50000" b="180000"/>
+          </a:path>
+        </a:gradFill>
+        <a:gradFill rotWithShape="1">
+          <a:gsLst>
+            <a:gs pos="0">
+              <a:schemeClr val="phClr">
+                <a:tint val="80000"/>
+                <a:satMod val="300000"/>
+              </a:schemeClr>
+            </a:gs>
+            <a:gs pos="100000">
+              <a:schemeClr val="phClr">
+                <a:shade val="30000"/>
+                <a:satMod val="200000"/>
+              </a:schemeClr>
+            </a:gs>
+          </a:gsLst>
+          <a:path path="circle">
+            <a:fillToRect l="50000" t="50000" r="50000" b="50000"/>
+          </a:path>
+        </a:gradFill>
+      </a:bgFillStyleLst>
+    </a:fmtScheme>
+  </a:themeElements>
+</a:theme>
+</file>
+
+<file path=ppt/theme/theme2.xml><?xml version="1.0" encoding="utf-8"?>
 <a:theme xmlns:a="http://schemas.openxmlformats.org/drawingml/2006/main" xmlns:r="http://schemas.openxmlformats.org/officeDocument/2006/relationships" name="Tema de Office">
   <a:themeElements>
     <a:clrScheme name="Office">
@@ -30729,283 +30782,4 @@
     </a:fmtScheme>
   </a:themeElements>
 </a:theme>
-</file>
-
-<file path=ppt/theme/theme2.xml><?xml version="1.0" encoding="utf-8"?>
-<a:theme xmlns:a="http://schemas.openxmlformats.org/drawingml/2006/main" xmlns:r="http://schemas.openxmlformats.org/officeDocument/2006/relationships" name="ITBA">
-  <a:themeElements>
-    <a:clrScheme name="Tema de Office">
-      <a:dk1>
-        <a:srgbClr val="000000"/>
-      </a:dk1>
-      <a:lt1>
-        <a:srgbClr val="FFFFFF"/>
-      </a:lt1>
-      <a:dk2>
-        <a:srgbClr val="44546A"/>
-      </a:dk2>
-      <a:lt2>
-        <a:srgbClr val="E7E6E6"/>
-      </a:lt2>
-      <a:accent1>
-        <a:srgbClr val="5B9BD5"/>
-      </a:accent1>
-      <a:accent2>
-        <a:srgbClr val="ED7D31"/>
-      </a:accent2>
-      <a:accent3>
-        <a:srgbClr val="A5A5A5"/>
-      </a:accent3>
-      <a:accent4>
-        <a:srgbClr val="FFC000"/>
-      </a:accent4>
-      <a:accent5>
-        <a:srgbClr val="4472C4"/>
-      </a:accent5>
-      <a:accent6>
-        <a:srgbClr val="70AD47"/>
-      </a:accent6>
-      <a:hlink>
-        <a:srgbClr val="0563C1"/>
-      </a:hlink>
-      <a:folHlink>
-        <a:srgbClr val="954F72"/>
-      </a:folHlink>
-    </a:clrScheme>
-    <a:fontScheme name="Office">
-      <a:majorFont>
-        <a:latin typeface="Arial"/>
-        <a:ea typeface=""/>
-        <a:cs typeface=""/>
-        <a:font script="Jpan" typeface="ＭＳ Ｐゴシック"/>
-        <a:font script="Hang" typeface="맑은 고딕"/>
-        <a:font script="Hans" typeface="宋体"/>
-        <a:font script="Hant" typeface="新細明體"/>
-        <a:font script="Arab" typeface="Times New Roman"/>
-        <a:font script="Hebr" typeface="Times New Roman"/>
-        <a:font script="Thai" typeface="Angsana New"/>
-        <a:font script="Ethi" typeface="Nyala"/>
-        <a:font script="Beng" typeface="Vrinda"/>
-        <a:font script="Gujr" typeface="Shruti"/>
-        <a:font script="Khmr" typeface="MoolBoran"/>
-        <a:font script="Knda" typeface="Tunga"/>
-        <a:font script="Guru" typeface="Raavi"/>
-        <a:font script="Cans" typeface="Euphemia"/>
-        <a:font script="Cher" typeface="Plantagenet Cherokee"/>
-        <a:font script="Yiii" typeface="Microsoft Yi Baiti"/>
-        <a:font script="Tibt" typeface="Microsoft Himalaya"/>
-        <a:font script="Thaa" typeface="MV Boli"/>
-        <a:font script="Deva" typeface="Mangal"/>
-        <a:font script="Telu" typeface="Gautami"/>
-        <a:font script="Taml" typeface="Latha"/>
-        <a:font script="Syrc" typeface="Estrangelo Edessa"/>
-        <a:font script="Orya" typeface="Kalinga"/>
-        <a:font script="Mlym" typeface="Kartika"/>
-        <a:font script="Laoo" typeface="DokChampa"/>
-        <a:font script="Sinh" typeface="Iskoola Pota"/>
-        <a:font script="Mong" typeface="Mongolian Baiti"/>
-        <a:font script="Viet" typeface="Times New Roman"/>
-        <a:font script="Uigh" typeface="Microsoft Uighur"/>
-        <a:font script="Geor" typeface="Sylfaen"/>
-      </a:majorFont>
-      <a:minorFont>
-        <a:latin typeface="Arial"/>
-        <a:ea typeface=""/>
-        <a:cs typeface=""/>
-        <a:font script="Jpan" typeface="ＭＳ Ｐゴシック"/>
-        <a:font script="Hang" typeface="맑은 고딕"/>
-        <a:font script="Hans" typeface="宋体"/>
-        <a:font script="Hant" typeface="新細明體"/>
-        <a:font script="Arab" typeface="Arial"/>
-        <a:font script="Hebr" typeface="Arial"/>
-        <a:font script="Thai" typeface="Cordia New"/>
-        <a:font script="Ethi" typeface="Nyala"/>
-        <a:font script="Beng" typeface="Vrinda"/>
-        <a:font script="Gujr" typeface="Shruti"/>
-        <a:font script="Khmr" typeface="DaunPenh"/>
-        <a:font script="Knda" typeface="Tunga"/>
-        <a:font script="Guru" typeface="Raavi"/>
-        <a:font script="Cans" typeface="Euphemia"/>
-        <a:font script="Cher" typeface="Plantagenet Cherokee"/>
-        <a:font script="Yiii" typeface="Microsoft Yi Baiti"/>
-        <a:font script="Tibt" typeface="Microsoft Himalaya"/>
-        <a:font script="Thaa" typeface="MV Boli"/>
-        <a:font script="Deva" typeface="Mangal"/>
-        <a:font script="Telu" typeface="Gautami"/>
-        <a:font script="Taml" typeface="Latha"/>
-        <a:font script="Syrc" typeface="Estrangelo Edessa"/>
-        <a:font script="Orya" typeface="Kalinga"/>
-        <a:font script="Mlym" typeface="Kartika"/>
-        <a:font script="Laoo" typeface="DokChampa"/>
-        <a:font script="Sinh" typeface="Iskoola Pota"/>
-        <a:font script="Mong" typeface="Mongolian Baiti"/>
-        <a:font script="Viet" typeface="Arial"/>
-        <a:font script="Uigh" typeface="Microsoft Uighur"/>
-        <a:font script="Geor" typeface="Sylfaen"/>
-      </a:minorFont>
-    </a:fontScheme>
-    <a:fmtScheme name="Office">
-      <a:fillStyleLst>
-        <a:solidFill>
-          <a:schemeClr val="phClr"/>
-        </a:solidFill>
-        <a:gradFill rotWithShape="1">
-          <a:gsLst>
-            <a:gs pos="0">
-              <a:schemeClr val="phClr">
-                <a:tint val="50000"/>
-                <a:satMod val="300000"/>
-              </a:schemeClr>
-            </a:gs>
-            <a:gs pos="35000">
-              <a:schemeClr val="phClr">
-                <a:tint val="37000"/>
-                <a:satMod val="300000"/>
-              </a:schemeClr>
-            </a:gs>
-            <a:gs pos="100000">
-              <a:schemeClr val="phClr">
-                <a:tint val="15000"/>
-                <a:satMod val="350000"/>
-              </a:schemeClr>
-            </a:gs>
-          </a:gsLst>
-          <a:lin ang="16200000" scaled="1"/>
-        </a:gradFill>
-        <a:gradFill rotWithShape="1">
-          <a:gsLst>
-            <a:gs pos="0">
-              <a:schemeClr val="phClr">
-                <a:tint val="100000"/>
-                <a:shade val="100000"/>
-                <a:satMod val="130000"/>
-              </a:schemeClr>
-            </a:gs>
-            <a:gs pos="100000">
-              <a:schemeClr val="phClr">
-                <a:tint val="50000"/>
-                <a:shade val="100000"/>
-                <a:satMod val="350000"/>
-              </a:schemeClr>
-            </a:gs>
-          </a:gsLst>
-          <a:lin ang="16200000" scaled="0"/>
-        </a:gradFill>
-      </a:fillStyleLst>
-      <a:lnStyleLst>
-        <a:ln w="9525" cap="flat" cmpd="sng" algn="ctr">
-          <a:solidFill>
-            <a:schemeClr val="phClr">
-              <a:shade val="95000"/>
-              <a:satMod val="105000"/>
-            </a:schemeClr>
-          </a:solidFill>
-          <a:prstDash val="solid"/>
-        </a:ln>
-        <a:ln w="25400" cap="flat" cmpd="sng" algn="ctr">
-          <a:solidFill>
-            <a:schemeClr val="phClr"/>
-          </a:solidFill>
-          <a:prstDash val="solid"/>
-        </a:ln>
-        <a:ln w="38100" cap="flat" cmpd="sng" algn="ctr">
-          <a:solidFill>
-            <a:schemeClr val="phClr"/>
-          </a:solidFill>
-          <a:prstDash val="solid"/>
-        </a:ln>
-      </a:lnStyleLst>
-      <a:effectStyleLst>
-        <a:effectStyle>
-          <a:effectLst>
-            <a:outerShdw blurRad="40000" dist="20000" dir="5400000" rotWithShape="0">
-              <a:srgbClr val="000000">
-                <a:alpha val="38000"/>
-              </a:srgbClr>
-            </a:outerShdw>
-          </a:effectLst>
-        </a:effectStyle>
-        <a:effectStyle>
-          <a:effectLst>
-            <a:outerShdw blurRad="40000" dist="23000" dir="5400000" rotWithShape="0">
-              <a:srgbClr val="000000">
-                <a:alpha val="35000"/>
-              </a:srgbClr>
-            </a:outerShdw>
-          </a:effectLst>
-        </a:effectStyle>
-        <a:effectStyle>
-          <a:effectLst>
-            <a:outerShdw blurRad="40000" dist="23000" dir="5400000" rotWithShape="0">
-              <a:srgbClr val="000000">
-                <a:alpha val="35000"/>
-              </a:srgbClr>
-            </a:outerShdw>
-          </a:effectLst>
-          <a:scene3d>
-            <a:camera prst="orthographicFront">
-              <a:rot lat="0" lon="0" rev="0"/>
-            </a:camera>
-            <a:lightRig rig="threePt" dir="t">
-              <a:rot lat="0" lon="0" rev="1200000"/>
-            </a:lightRig>
-          </a:scene3d>
-          <a:sp3d>
-            <a:bevelT w="63500" h="25400"/>
-          </a:sp3d>
-        </a:effectStyle>
-      </a:effectStyleLst>
-      <a:bgFillStyleLst>
-        <a:solidFill>
-          <a:schemeClr val="phClr"/>
-        </a:solidFill>
-        <a:gradFill rotWithShape="1">
-          <a:gsLst>
-            <a:gs pos="0">
-              <a:schemeClr val="phClr">
-                <a:tint val="40000"/>
-                <a:satMod val="350000"/>
-              </a:schemeClr>
-            </a:gs>
-            <a:gs pos="40000">
-              <a:schemeClr val="phClr">
-                <a:tint val="45000"/>
-                <a:shade val="99000"/>
-                <a:satMod val="350000"/>
-              </a:schemeClr>
-            </a:gs>
-            <a:gs pos="100000">
-              <a:schemeClr val="phClr">
-                <a:shade val="20000"/>
-                <a:satMod val="255000"/>
-              </a:schemeClr>
-            </a:gs>
-          </a:gsLst>
-          <a:path path="circle">
-            <a:fillToRect l="50000" t="-80000" r="50000" b="180000"/>
-          </a:path>
-        </a:gradFill>
-        <a:gradFill rotWithShape="1">
-          <a:gsLst>
-            <a:gs pos="0">
-              <a:schemeClr val="phClr">
-                <a:tint val="80000"/>
-                <a:satMod val="300000"/>
-              </a:schemeClr>
-            </a:gs>
-            <a:gs pos="100000">
-              <a:schemeClr val="phClr">
-                <a:shade val="30000"/>
-                <a:satMod val="200000"/>
-              </a:schemeClr>
-            </a:gs>
-          </a:gsLst>
-          <a:path path="circle">
-            <a:fillToRect l="50000" t="50000" r="50000" b="50000"/>
-          </a:path>
-        </a:gradFill>
-      </a:bgFillStyleLst>
-    </a:fmtScheme>
-  </a:themeElements>
-</a:theme>
 </file>
</xml_diff>